<commit_message>
Jean Piaget Viernes 1 marzo
</commit_message>
<xml_diff>
--- a/JeanPiaget/Presentaciones/03_SelecciónMuestra.pptx
+++ b/JeanPiaget/Presentaciones/03_SelecciónMuestra.pptx
@@ -17,18 +17,20 @@
     <p:sldId id="260" r:id="rId11"/>
     <p:sldId id="269" r:id="rId12"/>
     <p:sldId id="268" r:id="rId13"/>
-    <p:sldId id="270" r:id="rId14"/>
-    <p:sldId id="271" r:id="rId15"/>
-    <p:sldId id="272" r:id="rId16"/>
-    <p:sldId id="273" r:id="rId17"/>
-    <p:sldId id="274" r:id="rId18"/>
-    <p:sldId id="276" r:id="rId19"/>
-    <p:sldId id="278" r:id="rId20"/>
-    <p:sldId id="277" r:id="rId21"/>
-    <p:sldId id="280" r:id="rId22"/>
-    <p:sldId id="279" r:id="rId23"/>
-    <p:sldId id="281" r:id="rId24"/>
-    <p:sldId id="261" r:id="rId25"/>
+    <p:sldId id="272" r:id="rId14"/>
+    <p:sldId id="273" r:id="rId15"/>
+    <p:sldId id="274" r:id="rId16"/>
+    <p:sldId id="276" r:id="rId17"/>
+    <p:sldId id="278" r:id="rId18"/>
+    <p:sldId id="277" r:id="rId19"/>
+    <p:sldId id="280" r:id="rId20"/>
+    <p:sldId id="279" r:id="rId21"/>
+    <p:sldId id="281" r:id="rId22"/>
+    <p:sldId id="261" r:id="rId23"/>
+    <p:sldId id="282" r:id="rId24"/>
+    <p:sldId id="283" r:id="rId25"/>
+    <p:sldId id="284" r:id="rId26"/>
+    <p:sldId id="285" r:id="rId27"/>
   </p:sldIdLst>
   <p:sldSz cx="12192000" cy="6858000"/>
   <p:notesSz cx="6858000" cy="9144000"/>
@@ -277,7 +279,7 @@
           <a:p>
             <a:fld id="{606FEDCB-E240-4DFD-BB3D-42E4F99D1B13}" type="datetimeFigureOut">
               <a:rPr lang="es-MX" smtClean="0"/>
-              <a:t>19/02/2019</a:t>
+              <a:t>28/02/2019</a:t>
             </a:fld>
             <a:endParaRPr lang="es-MX"/>
           </a:p>
@@ -447,7 +449,7 @@
           <a:p>
             <a:fld id="{606FEDCB-E240-4DFD-BB3D-42E4F99D1B13}" type="datetimeFigureOut">
               <a:rPr lang="es-MX" smtClean="0"/>
-              <a:t>19/02/2019</a:t>
+              <a:t>28/02/2019</a:t>
             </a:fld>
             <a:endParaRPr lang="es-MX"/>
           </a:p>
@@ -627,7 +629,7 @@
           <a:p>
             <a:fld id="{606FEDCB-E240-4DFD-BB3D-42E4F99D1B13}" type="datetimeFigureOut">
               <a:rPr lang="es-MX" smtClean="0"/>
-              <a:t>19/02/2019</a:t>
+              <a:t>28/02/2019</a:t>
             </a:fld>
             <a:endParaRPr lang="es-MX"/>
           </a:p>
@@ -797,7 +799,7 @@
           <a:p>
             <a:fld id="{606FEDCB-E240-4DFD-BB3D-42E4F99D1B13}" type="datetimeFigureOut">
               <a:rPr lang="es-MX" smtClean="0"/>
-              <a:t>19/02/2019</a:t>
+              <a:t>28/02/2019</a:t>
             </a:fld>
             <a:endParaRPr lang="es-MX"/>
           </a:p>
@@ -1043,7 +1045,7 @@
           <a:p>
             <a:fld id="{606FEDCB-E240-4DFD-BB3D-42E4F99D1B13}" type="datetimeFigureOut">
               <a:rPr lang="es-MX" smtClean="0"/>
-              <a:t>19/02/2019</a:t>
+              <a:t>28/02/2019</a:t>
             </a:fld>
             <a:endParaRPr lang="es-MX"/>
           </a:p>
@@ -1275,7 +1277,7 @@
           <a:p>
             <a:fld id="{606FEDCB-E240-4DFD-BB3D-42E4F99D1B13}" type="datetimeFigureOut">
               <a:rPr lang="es-MX" smtClean="0"/>
-              <a:t>19/02/2019</a:t>
+              <a:t>28/02/2019</a:t>
             </a:fld>
             <a:endParaRPr lang="es-MX"/>
           </a:p>
@@ -1642,7 +1644,7 @@
           <a:p>
             <a:fld id="{606FEDCB-E240-4DFD-BB3D-42E4F99D1B13}" type="datetimeFigureOut">
               <a:rPr lang="es-MX" smtClean="0"/>
-              <a:t>19/02/2019</a:t>
+              <a:t>28/02/2019</a:t>
             </a:fld>
             <a:endParaRPr lang="es-MX"/>
           </a:p>
@@ -1760,7 +1762,7 @@
           <a:p>
             <a:fld id="{606FEDCB-E240-4DFD-BB3D-42E4F99D1B13}" type="datetimeFigureOut">
               <a:rPr lang="es-MX" smtClean="0"/>
-              <a:t>19/02/2019</a:t>
+              <a:t>28/02/2019</a:t>
             </a:fld>
             <a:endParaRPr lang="es-MX"/>
           </a:p>
@@ -1855,7 +1857,7 @@
           <a:p>
             <a:fld id="{606FEDCB-E240-4DFD-BB3D-42E4F99D1B13}" type="datetimeFigureOut">
               <a:rPr lang="es-MX" smtClean="0"/>
-              <a:t>19/02/2019</a:t>
+              <a:t>28/02/2019</a:t>
             </a:fld>
             <a:endParaRPr lang="es-MX"/>
           </a:p>
@@ -2132,7 +2134,7 @@
           <a:p>
             <a:fld id="{606FEDCB-E240-4DFD-BB3D-42E4F99D1B13}" type="datetimeFigureOut">
               <a:rPr lang="es-MX" smtClean="0"/>
-              <a:t>19/02/2019</a:t>
+              <a:t>28/02/2019</a:t>
             </a:fld>
             <a:endParaRPr lang="es-MX"/>
           </a:p>
@@ -2385,7 +2387,7 @@
           <a:p>
             <a:fld id="{606FEDCB-E240-4DFD-BB3D-42E4F99D1B13}" type="datetimeFigureOut">
               <a:rPr lang="es-MX" smtClean="0"/>
-              <a:t>19/02/2019</a:t>
+              <a:t>28/02/2019</a:t>
             </a:fld>
             <a:endParaRPr lang="es-MX"/>
           </a:p>
@@ -2598,7 +2600,7 @@
           <a:p>
             <a:fld id="{606FEDCB-E240-4DFD-BB3D-42E4F99D1B13}" type="datetimeFigureOut">
               <a:rPr lang="es-MX" smtClean="0"/>
-              <a:t>19/02/2019</a:t>
+              <a:t>28/02/2019</a:t>
             </a:fld>
             <a:endParaRPr lang="es-MX"/>
           </a:p>
@@ -3216,6 +3218,13 @@
   <p:clrMapOvr>
     <a:masterClrMapping/>
   </p:clrMapOvr>
+  <p:timing>
+    <p:tnLst>
+      <p:par>
+        <p:cTn id="1" dur="indefinite" restart="never" nodeType="tmRoot"/>
+      </p:par>
+    </p:tnLst>
+  </p:timing>
 </p:sld>
 </file>
 
@@ -3578,6 +3587,13 @@
   <p:clrMapOvr>
     <a:masterClrMapping/>
   </p:clrMapOvr>
+  <p:timing>
+    <p:tnLst>
+      <p:par>
+        <p:cTn id="1" dur="indefinite" restart="never" nodeType="tmRoot"/>
+      </p:par>
+    </p:tnLst>
+  </p:timing>
 </p:sld>
 </file>
 
@@ -3789,6 +3805,13 @@
   <p:clrMapOvr>
     <a:masterClrMapping/>
   </p:clrMapOvr>
+  <p:timing>
+    <p:tnLst>
+      <p:par>
+        <p:cTn id="1" dur="indefinite" restart="never" nodeType="tmRoot"/>
+      </p:par>
+    </p:tnLst>
+  </p:timing>
 </p:sld>
 </file>
 
@@ -4108,6 +4131,13 @@
   <p:clrMapOvr>
     <a:masterClrMapping/>
   </p:clrMapOvr>
+  <p:timing>
+    <p:tnLst>
+      <p:par>
+        <p:cTn id="1" dur="indefinite" restart="never" nodeType="tmRoot"/>
+      </p:par>
+    </p:tnLst>
+  </p:timing>
 </p:sld>
 </file>
 
@@ -4140,8 +4170,8 @@
         </p:nvSpPr>
         <p:spPr>
           <a:xfrm>
-            <a:off x="838200" y="365125"/>
-            <a:ext cx="10515600" cy="727075"/>
+            <a:off x="228600" y="365125"/>
+            <a:ext cx="11836400" cy="1325563"/>
           </a:xfrm>
         </p:spPr>
         <p:txBody>
@@ -4150,7 +4180,19 @@
           <a:p>
             <a:r>
               <a:rPr lang="es-MX" b="1" dirty="0" smtClean="0"/>
-              <a:t>“Casos de la Vida Real”</a:t>
+              <a:t>Pasos necesarios</a:t>
+            </a:r>
+            <a:r>
+              <a:rPr lang="es-MX" dirty="0"/>
+              <a:t> </a:t>
+            </a:r>
+            <a:r>
+              <a:rPr lang="es-MX" dirty="0" smtClean="0"/>
+              <a:t>para obtener una </a:t>
+            </a:r>
+            <a:r>
+              <a:rPr lang="es-MX" b="1" dirty="0" smtClean="0"/>
+              <a:t>Muestra probabilística</a:t>
             </a:r>
             <a:endParaRPr lang="es-MX" b="1" dirty="0"/>
           </a:p>
@@ -4158,7 +4200,7 @@
       </p:sp>
       <p:sp>
         <p:nvSpPr>
-          <p:cNvPr id="7" name="Marcador de contenido 6"/>
+          <p:cNvPr id="3" name="Marcador de contenido 2"/>
           <p:cNvSpPr>
             <a:spLocks noGrp="1"/>
           </p:cNvSpPr>
@@ -4166,26 +4208,51 @@
             <p:ph idx="1"/>
           </p:nvPr>
         </p:nvSpPr>
-        <p:spPr>
-          <a:xfrm>
-            <a:off x="381000" y="1169457"/>
-            <a:ext cx="7950200" cy="5146675"/>
-          </a:xfrm>
-        </p:spPr>
+        <p:spPr/>
         <p:txBody>
           <a:bodyPr/>
           <a:lstStyle/>
           <a:p>
+            <a:r>
+              <a:rPr lang="es-MX" dirty="0" smtClean="0"/>
+              <a:t>1) Cuidar el </a:t>
+            </a:r>
+            <a:r>
+              <a:rPr lang="es-MX" b="1" u="sng" dirty="0" smtClean="0"/>
+              <a:t>Tamaño de la muestra</a:t>
+            </a:r>
+            <a:endParaRPr lang="es-MX" u="sng" dirty="0" smtClean="0"/>
+          </a:p>
+          <a:p>
+            <a:pPr marL="0" indent="0">
+              <a:buNone/>
+            </a:pPr>
             <a:endParaRPr lang="es-MX" dirty="0" smtClean="0"/>
           </a:p>
           <a:p>
+            <a:r>
+              <a:rPr lang="es-MX" dirty="0" smtClean="0"/>
+              <a:t>2) Buscar que efectivamente </a:t>
+            </a:r>
+            <a:r>
+              <a:rPr lang="es-MX" b="1" dirty="0" smtClean="0"/>
+              <a:t>todos los elementos de la población tengan </a:t>
+            </a:r>
+            <a:r>
+              <a:rPr lang="es-MX" dirty="0" smtClean="0"/>
+              <a:t>–en la medida de lo posible- </a:t>
+            </a:r>
+            <a:r>
+              <a:rPr lang="es-MX" b="1" dirty="0" smtClean="0"/>
+              <a:t>la misma probabilidad de ser seleccionados.</a:t>
+            </a:r>
             <a:endParaRPr lang="es-MX" dirty="0"/>
           </a:p>
         </p:txBody>
       </p:sp>
       <p:sp>
         <p:nvSpPr>
-          <p:cNvPr id="5" name="Rectángulo 4"/>
+          <p:cNvPr id="4" name="Rectángulo 3"/>
           <p:cNvSpPr/>
           <p:nvPr/>
         </p:nvSpPr>
@@ -4236,7 +4303,7 @@
       </p:sp>
       <p:sp>
         <p:nvSpPr>
-          <p:cNvPr id="6" name="Rectángulo 5"/>
+          <p:cNvPr id="5" name="Rectángulo 4"/>
           <p:cNvSpPr/>
           <p:nvPr/>
         </p:nvSpPr>
@@ -4285,81 +4352,23 @@
           </a:p>
         </p:txBody>
       </p:sp>
-      <p:pic>
-        <p:nvPicPr>
-          <p:cNvPr id="1026" name="Picture 2" descr="Resultado de imagen para Shere Hite 1991 Mujeres y amor"/>
-          <p:cNvPicPr>
-            <a:picLocks noChangeAspect="1" noChangeArrowheads="1"/>
-          </p:cNvPicPr>
-          <p:nvPr/>
-        </p:nvPicPr>
-        <p:blipFill>
-          <a:blip r:embed="rId2">
-            <a:extLst>
-              <a:ext uri="{28A0092B-C50C-407E-A947-70E740481C1C}">
-                <a14:useLocalDpi xmlns:a14="http://schemas.microsoft.com/office/drawing/2010/main" val="0"/>
-              </a:ext>
-            </a:extLst>
-          </a:blip>
-          <a:srcRect/>
-          <a:stretch>
-            <a:fillRect/>
-          </a:stretch>
-        </p:blipFill>
-        <p:spPr bwMode="auto">
-          <a:xfrm>
-            <a:off x="8682567" y="1604431"/>
-            <a:ext cx="2857500" cy="4276726"/>
-          </a:xfrm>
-          <a:prstGeom prst="rect">
-            <a:avLst/>
-          </a:prstGeom>
-          <a:noFill/>
-          <a:extLst>
-            <a:ext uri="{909E8E84-426E-40DD-AFC4-6F175D3DCCD1}">
-              <a14:hiddenFill xmlns:a14="http://schemas.microsoft.com/office/drawing/2010/main">
-                <a:solidFill>
-                  <a:srgbClr val="FFFFFF"/>
-                </a:solidFill>
-              </a14:hiddenFill>
-            </a:ext>
-          </a:extLst>
-        </p:spPr>
-      </p:pic>
-      <p:pic>
-        <p:nvPicPr>
-          <p:cNvPr id="4" name="Imagen 3"/>
-          <p:cNvPicPr>
-            <a:picLocks noChangeAspect="1"/>
-          </p:cNvPicPr>
-          <p:nvPr/>
-        </p:nvPicPr>
-        <p:blipFill>
-          <a:blip r:embed="rId3"/>
-          <a:stretch>
-            <a:fillRect/>
-          </a:stretch>
-        </p:blipFill>
-        <p:spPr>
-          <a:xfrm>
-            <a:off x="700087" y="2210269"/>
-            <a:ext cx="7779280" cy="2437462"/>
-          </a:xfrm>
-          <a:prstGeom prst="rect">
-            <a:avLst/>
-          </a:prstGeom>
-        </p:spPr>
-      </p:pic>
     </p:spTree>
     <p:extLst>
       <p:ext uri="{BB962C8B-B14F-4D97-AF65-F5344CB8AC3E}">
-        <p14:creationId xmlns:p14="http://schemas.microsoft.com/office/powerpoint/2010/main" val="1026960300"/>
+        <p14:creationId xmlns:p14="http://schemas.microsoft.com/office/powerpoint/2010/main" val="1224445391"/>
       </p:ext>
     </p:extLst>
   </p:cSld>
   <p:clrMapOvr>
     <a:masterClrMapping/>
   </p:clrMapOvr>
+  <p:timing>
+    <p:tnLst>
+      <p:par>
+        <p:cTn id="1" dur="indefinite" restart="never" nodeType="tmRoot"/>
+      </p:par>
+    </p:tnLst>
+  </p:timing>
 </p:sld>
 </file>
 
@@ -4390,19 +4399,14 @@
             <p:ph type="title"/>
           </p:nvPr>
         </p:nvSpPr>
-        <p:spPr>
-          <a:xfrm>
-            <a:off x="838200" y="365125"/>
-            <a:ext cx="10515600" cy="727075"/>
-          </a:xfrm>
-        </p:spPr>
+        <p:spPr/>
         <p:txBody>
           <a:bodyPr/>
           <a:lstStyle/>
           <a:p>
             <a:r>
               <a:rPr lang="es-MX" b="1" dirty="0" smtClean="0"/>
-              <a:t>“Casos de la Vida Real”</a:t>
+              <a:t>El tamaño de la muestra</a:t>
             </a:r>
             <a:endParaRPr lang="es-MX" b="1" dirty="0"/>
           </a:p>
@@ -4410,7 +4414,7 @@
       </p:sp>
       <p:sp>
         <p:nvSpPr>
-          <p:cNvPr id="7" name="Marcador de contenido 6"/>
+          <p:cNvPr id="3" name="Marcador de contenido 2"/>
           <p:cNvSpPr>
             <a:spLocks noGrp="1"/>
           </p:cNvSpPr>
@@ -4418,12 +4422,7 @@
             <p:ph idx="1"/>
           </p:nvPr>
         </p:nvSpPr>
-        <p:spPr>
-          <a:xfrm>
-            <a:off x="381000" y="1169457"/>
-            <a:ext cx="7950200" cy="5146675"/>
-          </a:xfrm>
-        </p:spPr>
+        <p:spPr/>
         <p:txBody>
           <a:bodyPr/>
           <a:lstStyle/>
@@ -4437,7 +4436,7 @@
       </p:sp>
       <p:sp>
         <p:nvSpPr>
-          <p:cNvPr id="5" name="Rectángulo 4"/>
+          <p:cNvPr id="4" name="Rectángulo 3"/>
           <p:cNvSpPr/>
           <p:nvPr/>
         </p:nvSpPr>
@@ -4450,9 +4449,8 @@
             <a:avLst/>
           </a:prstGeom>
           <a:solidFill>
-            <a:schemeClr val="accent4">
-              <a:lumMod val="60000"/>
-              <a:lumOff val="40000"/>
+            <a:schemeClr val="accent2">
+              <a:lumMod val="75000"/>
             </a:schemeClr>
           </a:solidFill>
           <a:ln>
@@ -4488,7 +4486,7 @@
       </p:sp>
       <p:sp>
         <p:nvSpPr>
-          <p:cNvPr id="6" name="Rectángulo 5"/>
+          <p:cNvPr id="5" name="Rectángulo 4"/>
           <p:cNvSpPr/>
           <p:nvPr/>
         </p:nvSpPr>
@@ -4501,9 +4499,8 @@
             <a:avLst/>
           </a:prstGeom>
           <a:solidFill>
-            <a:schemeClr val="accent4">
-              <a:lumMod val="60000"/>
-              <a:lumOff val="40000"/>
+            <a:schemeClr val="accent2">
+              <a:lumMod val="75000"/>
             </a:schemeClr>
           </a:solidFill>
           <a:ln>
@@ -4539,87 +4536,22 @@
       </p:sp>
       <p:pic>
         <p:nvPicPr>
-          <p:cNvPr id="1026" name="Picture 2" descr="Resultado de imagen para Shere Hite 1991 Mujeres y amor"/>
-          <p:cNvPicPr>
-            <a:picLocks noChangeAspect="1" noChangeArrowheads="1"/>
-          </p:cNvPicPr>
-          <p:nvPr/>
-        </p:nvPicPr>
-        <p:blipFill>
-          <a:blip r:embed="rId2">
-            <a:extLst>
-              <a:ext uri="{28A0092B-C50C-407E-A947-70E740481C1C}">
-                <a14:useLocalDpi xmlns:a14="http://schemas.microsoft.com/office/drawing/2010/main" val="0"/>
-              </a:ext>
-            </a:extLst>
-          </a:blip>
-          <a:srcRect/>
-          <a:stretch>
-            <a:fillRect/>
-          </a:stretch>
-        </p:blipFill>
-        <p:spPr bwMode="auto">
-          <a:xfrm>
-            <a:off x="8682567" y="1604431"/>
-            <a:ext cx="2857500" cy="4276726"/>
-          </a:xfrm>
-          <a:prstGeom prst="rect">
-            <a:avLst/>
-          </a:prstGeom>
-          <a:noFill/>
-          <a:extLst>
-            <a:ext uri="{909E8E84-426E-40DD-AFC4-6F175D3DCCD1}">
-              <a14:hiddenFill xmlns:a14="http://schemas.microsoft.com/office/drawing/2010/main">
-                <a:solidFill>
-                  <a:srgbClr val="FFFFFF"/>
-                </a:solidFill>
-              </a14:hiddenFill>
-            </a:ext>
-          </a:extLst>
-        </p:spPr>
-      </p:pic>
-      <p:pic>
-        <p:nvPicPr>
-          <p:cNvPr id="3" name="Imagen 2"/>
+          <p:cNvPr id="6" name="Imagen 5"/>
           <p:cNvPicPr>
             <a:picLocks noChangeAspect="1"/>
           </p:cNvPicPr>
           <p:nvPr/>
         </p:nvPicPr>
         <p:blipFill>
-          <a:blip r:embed="rId3"/>
+          <a:blip r:embed="rId2"/>
           <a:stretch>
             <a:fillRect/>
           </a:stretch>
         </p:blipFill>
         <p:spPr>
           <a:xfrm>
-            <a:off x="84668" y="1346201"/>
-            <a:ext cx="8509000" cy="1348338"/>
-          </a:xfrm>
-          <a:prstGeom prst="rect">
-            <a:avLst/>
-          </a:prstGeom>
-        </p:spPr>
-      </p:pic>
-      <p:pic>
-        <p:nvPicPr>
-          <p:cNvPr id="8" name="Imagen 7"/>
-          <p:cNvPicPr>
-            <a:picLocks noChangeAspect="1"/>
-          </p:cNvPicPr>
-          <p:nvPr/>
-        </p:nvPicPr>
-        <p:blipFill>
-          <a:blip r:embed="rId4"/>
-          <a:stretch>
-            <a:fillRect/>
-          </a:stretch>
-        </p:blipFill>
-        <p:spPr>
-          <a:xfrm>
-            <a:off x="98954" y="2660672"/>
-            <a:ext cx="8494714" cy="3508521"/>
+            <a:off x="2573866" y="1346201"/>
+            <a:ext cx="6820164" cy="4661216"/>
           </a:xfrm>
           <a:prstGeom prst="rect">
             <a:avLst/>
@@ -4629,13 +4561,20 @@
     </p:spTree>
     <p:extLst>
       <p:ext uri="{BB962C8B-B14F-4D97-AF65-F5344CB8AC3E}">
-        <p14:creationId xmlns:p14="http://schemas.microsoft.com/office/powerpoint/2010/main" val="651564689"/>
+        <p14:creationId xmlns:p14="http://schemas.microsoft.com/office/powerpoint/2010/main" val="3554178593"/>
       </p:ext>
     </p:extLst>
   </p:cSld>
   <p:clrMapOvr>
     <a:masterClrMapping/>
   </p:clrMapOvr>
+  <p:timing>
+    <p:tnLst>
+      <p:par>
+        <p:cTn id="1" dur="indefinite" restart="never" nodeType="tmRoot"/>
+      </p:par>
+    </p:tnLst>
+  </p:timing>
 </p:sld>
 </file>
 
@@ -4666,61 +4605,35 @@
             <p:ph type="title"/>
           </p:nvPr>
         </p:nvSpPr>
-        <p:spPr>
-          <a:xfrm>
-            <a:off x="228600" y="365125"/>
-            <a:ext cx="11836400" cy="1325563"/>
-          </a:xfrm>
-        </p:spPr>
+        <p:spPr/>
+        <p:txBody>
+          <a:bodyPr>
+            <a:normAutofit fontScale="90000"/>
+          </a:bodyPr>
+          <a:lstStyle/>
+          <a:p>
+            <a:r>
+              <a:rPr lang="es-MX" b="1" dirty="0" smtClean="0"/>
+              <a:t>Garantizar que todos los elementos de la población tengan la misma probabilidad de ser seleccionados.</a:t>
+            </a:r>
+            <a:endParaRPr lang="es-MX" b="1" dirty="0"/>
+          </a:p>
+        </p:txBody>
+      </p:sp>
+      <p:sp>
+        <p:nvSpPr>
+          <p:cNvPr id="3" name="Marcador de contenido 2"/>
+          <p:cNvSpPr>
+            <a:spLocks noGrp="1"/>
+          </p:cNvSpPr>
+          <p:nvPr>
+            <p:ph idx="1"/>
+          </p:nvPr>
+        </p:nvSpPr>
+        <p:spPr/>
         <p:txBody>
           <a:bodyPr/>
           <a:lstStyle/>
-          <a:p>
-            <a:r>
-              <a:rPr lang="es-MX" b="1" dirty="0" smtClean="0"/>
-              <a:t>Pasos necesarios</a:t>
-            </a:r>
-            <a:r>
-              <a:rPr lang="es-MX" dirty="0"/>
-              <a:t> </a:t>
-            </a:r>
-            <a:r>
-              <a:rPr lang="es-MX" dirty="0" smtClean="0"/>
-              <a:t>para obtener una </a:t>
-            </a:r>
-            <a:r>
-              <a:rPr lang="es-MX" b="1" dirty="0" smtClean="0"/>
-              <a:t>Muestra probabilística</a:t>
-            </a:r>
-            <a:endParaRPr lang="es-MX" b="1" dirty="0"/>
-          </a:p>
-        </p:txBody>
-      </p:sp>
-      <p:sp>
-        <p:nvSpPr>
-          <p:cNvPr id="3" name="Marcador de contenido 2"/>
-          <p:cNvSpPr>
-            <a:spLocks noGrp="1"/>
-          </p:cNvSpPr>
-          <p:nvPr>
-            <p:ph idx="1"/>
-          </p:nvPr>
-        </p:nvSpPr>
-        <p:spPr/>
-        <p:txBody>
-          <a:bodyPr/>
-          <a:lstStyle/>
-          <a:p>
-            <a:r>
-              <a:rPr lang="es-MX" dirty="0" smtClean="0"/>
-              <a:t>1) Cuidar el </a:t>
-            </a:r>
-            <a:r>
-              <a:rPr lang="es-MX" b="1" u="sng" dirty="0" smtClean="0"/>
-              <a:t>Tamaño de la muestra</a:t>
-            </a:r>
-            <a:endParaRPr lang="es-MX" u="sng" dirty="0" smtClean="0"/>
-          </a:p>
           <a:p>
             <a:pPr marL="0" indent="0">
               <a:buNone/>
@@ -4728,21 +4641,55 @@
             <a:endParaRPr lang="es-MX" dirty="0" smtClean="0"/>
           </a:p>
           <a:p>
+            <a:pPr marL="0" indent="0">
+              <a:buNone/>
+            </a:pPr>
             <a:r>
               <a:rPr lang="es-MX" dirty="0" smtClean="0"/>
-              <a:t>2) Buscar que efectivamente </a:t>
+              <a:t>¿Cuál será la mejor manera de “pensar” acerca de mi población, de manera que pueda aspirar a tener una muestra que contenga elementos que sean </a:t>
             </a:r>
             <a:r>
               <a:rPr lang="es-MX" b="1" dirty="0" smtClean="0"/>
-              <a:t>todos los elementos de la población tengan </a:t>
+              <a:t>representativos</a:t>
             </a:r>
             <a:r>
               <a:rPr lang="es-MX" dirty="0" smtClean="0"/>
-              <a:t>–en la medida de lo posible- </a:t>
-            </a:r>
-            <a:r>
-              <a:rPr lang="es-MX" b="1" dirty="0" smtClean="0"/>
-              <a:t>la misma probabilidad de ser seleccionados.</a:t>
+              <a:t> de toda su variabilidad?</a:t>
+            </a:r>
+          </a:p>
+          <a:p>
+            <a:endParaRPr lang="es-MX" dirty="0"/>
+          </a:p>
+          <a:p>
+            <a:r>
+              <a:rPr lang="es-MX" b="1" u="sng" dirty="0" smtClean="0"/>
+              <a:t>Muestra Aleatoria Simple</a:t>
+            </a:r>
+          </a:p>
+          <a:p>
+            <a:pPr lvl="1"/>
+            <a:endParaRPr lang="es-MX" dirty="0" smtClean="0"/>
+          </a:p>
+          <a:p>
+            <a:pPr lvl="1"/>
+            <a:r>
+              <a:rPr lang="es-MX" dirty="0" smtClean="0"/>
+              <a:t>Muestreo Estratificado</a:t>
+            </a:r>
+          </a:p>
+          <a:p>
+            <a:pPr lvl="1"/>
+            <a:endParaRPr lang="es-MX" dirty="0" smtClean="0"/>
+          </a:p>
+          <a:p>
+            <a:pPr lvl="1"/>
+            <a:r>
+              <a:rPr lang="es-MX" dirty="0" smtClean="0"/>
+              <a:t>Muestreo por </a:t>
+            </a:r>
+            <a:r>
+              <a:rPr lang="es-MX" dirty="0" err="1" smtClean="0"/>
+              <a:t>Clusters</a:t>
             </a:r>
             <a:endParaRPr lang="es-MX" dirty="0"/>
           </a:p>
@@ -4763,9 +4710,8 @@
             <a:avLst/>
           </a:prstGeom>
           <a:solidFill>
-            <a:schemeClr val="accent4">
-              <a:lumMod val="60000"/>
-              <a:lumOff val="40000"/>
+            <a:schemeClr val="accent2">
+              <a:lumMod val="75000"/>
             </a:schemeClr>
           </a:solidFill>
           <a:ln>
@@ -4814,9 +4760,8 @@
             <a:avLst/>
           </a:prstGeom>
           <a:solidFill>
-            <a:schemeClr val="accent4">
-              <a:lumMod val="60000"/>
-              <a:lumOff val="40000"/>
+            <a:schemeClr val="accent2">
+              <a:lumMod val="75000"/>
             </a:schemeClr>
           </a:solidFill>
           <a:ln>
@@ -4853,13 +4798,20 @@
     </p:spTree>
     <p:extLst>
       <p:ext uri="{BB962C8B-B14F-4D97-AF65-F5344CB8AC3E}">
-        <p14:creationId xmlns:p14="http://schemas.microsoft.com/office/powerpoint/2010/main" val="1224445391"/>
+        <p14:creationId xmlns:p14="http://schemas.microsoft.com/office/powerpoint/2010/main" val="2324529830"/>
       </p:ext>
     </p:extLst>
   </p:cSld>
   <p:clrMapOvr>
     <a:masterClrMapping/>
   </p:clrMapOvr>
+  <p:timing>
+    <p:tnLst>
+      <p:par>
+        <p:cTn id="1" dur="indefinite" restart="never" nodeType="tmRoot"/>
+      </p:par>
+    </p:tnLst>
+  </p:timing>
 </p:sld>
 </file>
 
@@ -4892,36 +4844,91 @@
         </p:nvSpPr>
         <p:spPr/>
         <p:txBody>
+          <a:bodyPr>
+            <a:normAutofit fontScale="90000"/>
+          </a:bodyPr>
+          <a:lstStyle/>
+          <a:p>
+            <a:r>
+              <a:rPr lang="es-MX" b="1" dirty="0" smtClean="0"/>
+              <a:t>Garantizar que todos los elementos de la población tengan la misma probabilidad de ser seleccionados.</a:t>
+            </a:r>
+            <a:endParaRPr lang="es-MX" b="1" dirty="0"/>
+          </a:p>
+        </p:txBody>
+      </p:sp>
+      <p:sp>
+        <p:nvSpPr>
+          <p:cNvPr id="3" name="Marcador de contenido 2"/>
+          <p:cNvSpPr>
+            <a:spLocks noGrp="1"/>
+          </p:cNvSpPr>
+          <p:nvPr>
+            <p:ph idx="1"/>
+          </p:nvPr>
+        </p:nvSpPr>
+        <p:spPr/>
+        <p:txBody>
           <a:bodyPr/>
           <a:lstStyle/>
           <a:p>
             <a:r>
+              <a:rPr lang="es-MX" b="1" u="sng" dirty="0" smtClean="0"/>
+              <a:t>Muestreo Estratificado</a:t>
+            </a:r>
+          </a:p>
+          <a:p>
+            <a:pPr lvl="1"/>
+            <a:r>
               <a:rPr lang="es-MX" b="1" dirty="0" smtClean="0"/>
-              <a:t>El tamaño de la muestra</a:t>
-            </a:r>
+              <a:t>Particularmente útil</a:t>
+            </a:r>
+            <a:r>
+              <a:rPr lang="es-MX" dirty="0"/>
+              <a:t> </a:t>
+            </a:r>
+            <a:r>
+              <a:rPr lang="es-MX" dirty="0" smtClean="0"/>
+              <a:t>cuando el </a:t>
+            </a:r>
+            <a:r>
+              <a:rPr lang="es-MX" b="1" dirty="0" smtClean="0"/>
+              <a:t>objetivo es comparar </a:t>
+            </a:r>
+            <a:r>
+              <a:rPr lang="es-MX" dirty="0" smtClean="0"/>
+              <a:t>las mediciones obtenidas entre dos o más grupos.</a:t>
+            </a:r>
+          </a:p>
+          <a:p>
+            <a:pPr lvl="1"/>
             <a:endParaRPr lang="es-MX" b="1" dirty="0"/>
           </a:p>
-        </p:txBody>
-      </p:sp>
-      <p:sp>
-        <p:nvSpPr>
-          <p:cNvPr id="3" name="Marcador de contenido 2"/>
-          <p:cNvSpPr>
-            <a:spLocks noGrp="1"/>
-          </p:cNvSpPr>
-          <p:nvPr>
-            <p:ph idx="1"/>
-          </p:nvPr>
-        </p:nvSpPr>
-        <p:spPr/>
-        <p:txBody>
-          <a:bodyPr/>
-          <a:lstStyle/>
-          <a:p>
-            <a:endParaRPr lang="es-MX" dirty="0" smtClean="0"/>
-          </a:p>
-          <a:p>
-            <a:endParaRPr lang="es-MX" dirty="0"/>
+          <a:p>
+            <a:pPr lvl="1"/>
+            <a:r>
+              <a:rPr lang="es-MX" b="1" dirty="0" smtClean="0"/>
+              <a:t>Ejemplos: </a:t>
+            </a:r>
+          </a:p>
+          <a:p>
+            <a:pPr marL="914400" lvl="2" indent="0">
+              <a:buNone/>
+            </a:pPr>
+            <a:endParaRPr lang="es-MX" b="1" dirty="0" smtClean="0"/>
+          </a:p>
+          <a:p>
+            <a:pPr marL="914400" lvl="2" indent="0">
+              <a:buNone/>
+            </a:pPr>
+            <a:r>
+              <a:rPr lang="es-MX" b="1" dirty="0" smtClean="0"/>
+              <a:t>Pregunta de investigación: </a:t>
+            </a:r>
+            <a:r>
+              <a:rPr lang="es-MX" dirty="0" smtClean="0"/>
+              <a:t>¿Existen diferencias en habilidad matemática entre los y las estudiantes del Colegio Jean Piaget?</a:t>
+            </a:r>
           </a:p>
         </p:txBody>
       </p:sp>
@@ -5025,40 +5032,23 @@
           </a:p>
         </p:txBody>
       </p:sp>
-      <p:pic>
-        <p:nvPicPr>
-          <p:cNvPr id="6" name="Imagen 5"/>
-          <p:cNvPicPr>
-            <a:picLocks noChangeAspect="1"/>
-          </p:cNvPicPr>
-          <p:nvPr/>
-        </p:nvPicPr>
-        <p:blipFill>
-          <a:blip r:embed="rId2"/>
-          <a:stretch>
-            <a:fillRect/>
-          </a:stretch>
-        </p:blipFill>
-        <p:spPr>
-          <a:xfrm>
-            <a:off x="2573866" y="1346201"/>
-            <a:ext cx="6820164" cy="4661216"/>
-          </a:xfrm>
-          <a:prstGeom prst="rect">
-            <a:avLst/>
-          </a:prstGeom>
-        </p:spPr>
-      </p:pic>
     </p:spTree>
     <p:extLst>
       <p:ext uri="{BB962C8B-B14F-4D97-AF65-F5344CB8AC3E}">
-        <p14:creationId xmlns:p14="http://schemas.microsoft.com/office/powerpoint/2010/main" val="3554178593"/>
+        <p14:creationId xmlns:p14="http://schemas.microsoft.com/office/powerpoint/2010/main" val="1545324457"/>
       </p:ext>
     </p:extLst>
   </p:cSld>
   <p:clrMapOvr>
     <a:masterClrMapping/>
   </p:clrMapOvr>
+  <p:timing>
+    <p:tnLst>
+      <p:par>
+        <p:cTn id="1" dur="indefinite" restart="never" nodeType="tmRoot"/>
+      </p:par>
+    </p:tnLst>
+  </p:timing>
 </p:sld>
 </file>
 
@@ -5119,63 +5109,10 @@
           <a:bodyPr/>
           <a:lstStyle/>
           <a:p>
-            <a:pPr marL="0" indent="0">
-              <a:buNone/>
-            </a:pPr>
-            <a:endParaRPr lang="es-MX" dirty="0" smtClean="0"/>
-          </a:p>
-          <a:p>
-            <a:pPr marL="0" indent="0">
-              <a:buNone/>
-            </a:pPr>
-            <a:r>
-              <a:rPr lang="es-MX" dirty="0" smtClean="0"/>
-              <a:t>¿Cuál será la mejor manera de “pensar” acerca de mi población, de manera que pueda aspirar a tener una muestra que contenga elementos que sean </a:t>
-            </a:r>
-            <a:r>
-              <a:rPr lang="es-MX" b="1" dirty="0" smtClean="0"/>
-              <a:t>representativos</a:t>
-            </a:r>
-            <a:r>
-              <a:rPr lang="es-MX" dirty="0" smtClean="0"/>
-              <a:t> de toda su variabilidad?</a:t>
-            </a:r>
-          </a:p>
-          <a:p>
-            <a:endParaRPr lang="es-MX" dirty="0"/>
-          </a:p>
-          <a:p>
             <a:r>
               <a:rPr lang="es-MX" b="1" u="sng" dirty="0" smtClean="0"/>
-              <a:t>Muestra Aleatoria Simple</a:t>
-            </a:r>
-          </a:p>
-          <a:p>
-            <a:pPr lvl="1"/>
-            <a:endParaRPr lang="es-MX" dirty="0" smtClean="0"/>
-          </a:p>
-          <a:p>
-            <a:pPr lvl="1"/>
-            <a:r>
-              <a:rPr lang="es-MX" dirty="0" smtClean="0"/>
               <a:t>Muestreo Estratificado</a:t>
             </a:r>
-          </a:p>
-          <a:p>
-            <a:pPr lvl="1"/>
-            <a:endParaRPr lang="es-MX" dirty="0" smtClean="0"/>
-          </a:p>
-          <a:p>
-            <a:pPr lvl="1"/>
-            <a:r>
-              <a:rPr lang="es-MX" dirty="0" smtClean="0"/>
-              <a:t>Muestreo por </a:t>
-            </a:r>
-            <a:r>
-              <a:rPr lang="es-MX" dirty="0" err="1" smtClean="0"/>
-              <a:t>Clusters</a:t>
-            </a:r>
-            <a:endParaRPr lang="es-MX" dirty="0"/>
           </a:p>
         </p:txBody>
       </p:sp>
@@ -5279,16 +5216,47 @@
           </a:p>
         </p:txBody>
       </p:sp>
+      <p:pic>
+        <p:nvPicPr>
+          <p:cNvPr id="6" name="Imagen 5"/>
+          <p:cNvPicPr>
+            <a:picLocks noChangeAspect="1"/>
+          </p:cNvPicPr>
+          <p:nvPr/>
+        </p:nvPicPr>
+        <p:blipFill>
+          <a:blip r:embed="rId2"/>
+          <a:stretch>
+            <a:fillRect/>
+          </a:stretch>
+        </p:blipFill>
+        <p:spPr>
+          <a:xfrm>
+            <a:off x="2089680" y="2556934"/>
+            <a:ext cx="1879758" cy="3620029"/>
+          </a:xfrm>
+          <a:prstGeom prst="rect">
+            <a:avLst/>
+          </a:prstGeom>
+        </p:spPr>
+      </p:pic>
     </p:spTree>
     <p:extLst>
       <p:ext uri="{BB962C8B-B14F-4D97-AF65-F5344CB8AC3E}">
-        <p14:creationId xmlns:p14="http://schemas.microsoft.com/office/powerpoint/2010/main" val="2324529830"/>
+        <p14:creationId xmlns:p14="http://schemas.microsoft.com/office/powerpoint/2010/main" val="3027588462"/>
       </p:ext>
     </p:extLst>
   </p:cSld>
   <p:clrMapOvr>
     <a:masterClrMapping/>
   </p:clrMapOvr>
+  <p:timing>
+    <p:tnLst>
+      <p:par>
+        <p:cTn id="1" dur="indefinite" restart="never" nodeType="tmRoot"/>
+      </p:par>
+    </p:tnLst>
+  </p:timing>
 </p:sld>
 </file>
 
@@ -5351,61 +5319,37 @@
           <a:p>
             <a:r>
               <a:rPr lang="es-MX" b="1" u="sng" dirty="0" smtClean="0"/>
-              <a:t>Muestreo Estratificado</a:t>
-            </a:r>
+              <a:t>Muestreo por Racimos / </a:t>
+            </a:r>
+            <a:r>
+              <a:rPr lang="es-MX" b="1" u="sng" dirty="0" err="1" smtClean="0"/>
+              <a:t>Clusters</a:t>
+            </a:r>
+            <a:endParaRPr lang="es-MX" b="1" u="sng" dirty="0" smtClean="0"/>
           </a:p>
           <a:p>
             <a:pPr lvl="1"/>
             <a:r>
+              <a:rPr lang="es-MX" dirty="0" smtClean="0"/>
+              <a:t>Particularmente útil cuando se requiere </a:t>
+            </a:r>
+            <a:r>
               <a:rPr lang="es-MX" b="1" dirty="0" smtClean="0"/>
-              <a:t>Particularmente útil</a:t>
-            </a:r>
-            <a:r>
-              <a:rPr lang="es-MX" dirty="0"/>
-              <a:t> </a:t>
+              <a:t>ahorrar el costo </a:t>
             </a:r>
             <a:r>
               <a:rPr lang="es-MX" dirty="0" smtClean="0"/>
-              <a:t>cuando el </a:t>
+              <a:t>del muestreo (en términos de </a:t>
             </a:r>
             <a:r>
               <a:rPr lang="es-MX" b="1" dirty="0" smtClean="0"/>
-              <a:t>objetivo es comparar </a:t>
+              <a:t>tiempo, esfuerzo y dinero</a:t>
             </a:r>
             <a:r>
               <a:rPr lang="es-MX" dirty="0" smtClean="0"/>
-              <a:t>las mediciones obtenidas entre dos o más grupos.</a:t>
-            </a:r>
-          </a:p>
-          <a:p>
-            <a:pPr lvl="1"/>
-            <a:endParaRPr lang="es-MX" b="1" dirty="0"/>
-          </a:p>
-          <a:p>
-            <a:pPr lvl="1"/>
-            <a:r>
-              <a:rPr lang="es-MX" b="1" dirty="0" smtClean="0"/>
-              <a:t>Ejemplos: </a:t>
-            </a:r>
-          </a:p>
-          <a:p>
-            <a:pPr marL="914400" lvl="2" indent="0">
-              <a:buNone/>
-            </a:pPr>
-            <a:endParaRPr lang="es-MX" b="1" dirty="0" smtClean="0"/>
-          </a:p>
-          <a:p>
-            <a:pPr marL="914400" lvl="2" indent="0">
-              <a:buNone/>
-            </a:pPr>
-            <a:r>
-              <a:rPr lang="es-MX" b="1" dirty="0" smtClean="0"/>
-              <a:t>Pregunta de investigación: </a:t>
-            </a:r>
-            <a:r>
-              <a:rPr lang="es-MX" dirty="0" smtClean="0"/>
-              <a:t>¿Existen diferencias en habilidad matemática entre los y las estudiantes del Colegio Jean Piaget?</a:t>
-            </a:r>
+              <a:t>)</a:t>
+            </a:r>
+            <a:endParaRPr lang="es-MX" dirty="0"/>
           </a:p>
         </p:txBody>
       </p:sp>
@@ -5512,13 +5456,20 @@
     </p:spTree>
     <p:extLst>
       <p:ext uri="{BB962C8B-B14F-4D97-AF65-F5344CB8AC3E}">
-        <p14:creationId xmlns:p14="http://schemas.microsoft.com/office/powerpoint/2010/main" val="1545324457"/>
+        <p14:creationId xmlns:p14="http://schemas.microsoft.com/office/powerpoint/2010/main" val="3402522656"/>
       </p:ext>
     </p:extLst>
   </p:cSld>
   <p:clrMapOvr>
     <a:masterClrMapping/>
   </p:clrMapOvr>
+  <p:timing>
+    <p:tnLst>
+      <p:par>
+        <p:cTn id="1" dur="indefinite" restart="never" nodeType="tmRoot"/>
+      </p:par>
+    </p:tnLst>
+  </p:timing>
 </p:sld>
 </file>
 
@@ -5581,8 +5532,13 @@
           <a:p>
             <a:r>
               <a:rPr lang="es-MX" b="1" u="sng" dirty="0" smtClean="0"/>
-              <a:t>Muestreo Estratificado</a:t>
-            </a:r>
+              <a:t>Muestreo por Racimos / </a:t>
+            </a:r>
+            <a:r>
+              <a:rPr lang="es-MX" b="1" u="sng" dirty="0" err="1" smtClean="0"/>
+              <a:t>Clusters</a:t>
+            </a:r>
+            <a:endParaRPr lang="es-MX" b="1" u="sng" dirty="0"/>
           </a:p>
         </p:txBody>
       </p:sp>
@@ -5688,7 +5644,7 @@
       </p:sp>
       <p:pic>
         <p:nvPicPr>
-          <p:cNvPr id="6" name="Imagen 5"/>
+          <p:cNvPr id="7" name="Imagen 6"/>
           <p:cNvPicPr>
             <a:picLocks noChangeAspect="1"/>
           </p:cNvPicPr>
@@ -5702,7 +5658,7 @@
         </p:blipFill>
         <p:spPr>
           <a:xfrm>
-            <a:off x="2089680" y="2556934"/>
+            <a:off x="1954214" y="2448587"/>
             <a:ext cx="1879758" cy="3620029"/>
           </a:xfrm>
           <a:prstGeom prst="rect">
@@ -5713,13 +5669,20 @@
     </p:spTree>
     <p:extLst>
       <p:ext uri="{BB962C8B-B14F-4D97-AF65-F5344CB8AC3E}">
-        <p14:creationId xmlns:p14="http://schemas.microsoft.com/office/powerpoint/2010/main" val="3027588462"/>
+        <p14:creationId xmlns:p14="http://schemas.microsoft.com/office/powerpoint/2010/main" val="2798528973"/>
       </p:ext>
     </p:extLst>
   </p:cSld>
   <p:clrMapOvr>
     <a:masterClrMapping/>
   </p:clrMapOvr>
+  <p:timing>
+    <p:tnLst>
+      <p:par>
+        <p:cTn id="1" dur="indefinite" restart="never" nodeType="tmRoot"/>
+      </p:par>
+    </p:tnLst>
+  </p:timing>
 </p:sld>
 </file>
 
@@ -6081,31 +6044,7 @@
               <a:rPr lang="es-MX" b="1" u="sng" dirty="0" err="1" smtClean="0"/>
               <a:t>Clusters</a:t>
             </a:r>
-            <a:endParaRPr lang="es-MX" b="1" u="sng" dirty="0" smtClean="0"/>
-          </a:p>
-          <a:p>
-            <a:pPr lvl="1"/>
-            <a:r>
-              <a:rPr lang="es-MX" dirty="0" smtClean="0"/>
-              <a:t>Particularmente útil cuando se requiere </a:t>
-            </a:r>
-            <a:r>
-              <a:rPr lang="es-MX" b="1" dirty="0" smtClean="0"/>
-              <a:t>ahorrar el costo </a:t>
-            </a:r>
-            <a:r>
-              <a:rPr lang="es-MX" dirty="0" smtClean="0"/>
-              <a:t>del muestreo (en términos de </a:t>
-            </a:r>
-            <a:r>
-              <a:rPr lang="es-MX" b="1" dirty="0" smtClean="0"/>
-              <a:t>tiempo, esfuerzo y dinero</a:t>
-            </a:r>
-            <a:r>
-              <a:rPr lang="es-MX" dirty="0" smtClean="0"/>
-              <a:t>)</a:t>
-            </a:r>
-            <a:endParaRPr lang="es-MX" dirty="0"/>
+            <a:endParaRPr lang="es-MX" b="1" u="sng" dirty="0"/>
           </a:p>
         </p:txBody>
       </p:sp>
@@ -6209,16 +6148,47 @@
           </a:p>
         </p:txBody>
       </p:sp>
+      <p:pic>
+        <p:nvPicPr>
+          <p:cNvPr id="6" name="Imagen 5"/>
+          <p:cNvPicPr>
+            <a:picLocks noChangeAspect="1"/>
+          </p:cNvPicPr>
+          <p:nvPr/>
+        </p:nvPicPr>
+        <p:blipFill>
+          <a:blip r:embed="rId2"/>
+          <a:stretch>
+            <a:fillRect/>
+          </a:stretch>
+        </p:blipFill>
+        <p:spPr>
+          <a:xfrm>
+            <a:off x="2439988" y="2448587"/>
+            <a:ext cx="6534680" cy="3728376"/>
+          </a:xfrm>
+          <a:prstGeom prst="rect">
+            <a:avLst/>
+          </a:prstGeom>
+        </p:spPr>
+      </p:pic>
     </p:spTree>
     <p:extLst>
       <p:ext uri="{BB962C8B-B14F-4D97-AF65-F5344CB8AC3E}">
-        <p14:creationId xmlns:p14="http://schemas.microsoft.com/office/powerpoint/2010/main" val="3402522656"/>
+        <p14:creationId xmlns:p14="http://schemas.microsoft.com/office/powerpoint/2010/main" val="1617227629"/>
       </p:ext>
     </p:extLst>
   </p:cSld>
   <p:clrMapOvr>
     <a:masterClrMapping/>
   </p:clrMapOvr>
+  <p:timing>
+    <p:tnLst>
+      <p:par>
+        <p:cTn id="1" dur="indefinite" restart="never" nodeType="tmRoot"/>
+      </p:par>
+    </p:tnLst>
+  </p:timing>
 </p:sld>
 </file>
 
@@ -6251,16 +6221,18 @@
         </p:nvSpPr>
         <p:spPr/>
         <p:txBody>
-          <a:bodyPr>
-            <a:normAutofit fontScale="90000"/>
-          </a:bodyPr>
-          <a:lstStyle/>
-          <a:p>
+          <a:bodyPr/>
+          <a:lstStyle/>
+          <a:p>
+            <a:r>
+              <a:rPr lang="es-MX" dirty="0" smtClean="0"/>
+              <a:t>Métodos para conseguir una </a:t>
+            </a:r>
             <a:r>
               <a:rPr lang="es-MX" b="1" dirty="0" smtClean="0"/>
-              <a:t>Garantizar que todos los elementos de la población tengan la misma probabilidad de ser seleccionados.</a:t>
-            </a:r>
-            <a:endParaRPr lang="es-MX" b="1" dirty="0"/>
+              <a:t>muestra probabilística</a:t>
+            </a:r>
+            <a:endParaRPr lang="es-MX" dirty="0"/>
           </a:p>
         </p:txBody>
       </p:sp>
@@ -6280,151 +6252,64 @@
           <a:lstStyle/>
           <a:p>
             <a:r>
-              <a:rPr lang="es-MX" b="1" u="sng" dirty="0" smtClean="0"/>
-              <a:t>Muestreo por Racimos / </a:t>
-            </a:r>
-            <a:r>
-              <a:rPr lang="es-MX" b="1" u="sng" dirty="0" err="1" smtClean="0"/>
-              <a:t>Clusters</a:t>
-            </a:r>
-            <a:endParaRPr lang="es-MX" b="1" u="sng" dirty="0"/>
-          </a:p>
-        </p:txBody>
-      </p:sp>
-      <p:sp>
-        <p:nvSpPr>
-          <p:cNvPr id="4" name="Rectángulo 3"/>
-          <p:cNvSpPr/>
-          <p:nvPr/>
-        </p:nvSpPr>
-        <p:spPr>
-          <a:xfrm>
-            <a:off x="0" y="0"/>
-            <a:ext cx="12192000" cy="287867"/>
-          </a:xfrm>
-          <a:prstGeom prst="rect">
-            <a:avLst/>
-          </a:prstGeom>
-          <a:solidFill>
-            <a:schemeClr val="accent2">
-              <a:lumMod val="75000"/>
-            </a:schemeClr>
-          </a:solidFill>
-          <a:ln>
-            <a:solidFill>
-              <a:schemeClr val="tx1"/>
-            </a:solidFill>
-          </a:ln>
-        </p:spPr>
-        <p:style>
-          <a:lnRef idx="2">
-            <a:schemeClr val="accent1">
-              <a:shade val="50000"/>
-            </a:schemeClr>
-          </a:lnRef>
-          <a:fillRef idx="1">
-            <a:schemeClr val="accent1"/>
-          </a:fillRef>
-          <a:effectRef idx="0">
-            <a:schemeClr val="accent1"/>
-          </a:effectRef>
-          <a:fontRef idx="minor">
-            <a:schemeClr val="lt1"/>
-          </a:fontRef>
-        </p:style>
-        <p:txBody>
-          <a:bodyPr rtlCol="0" anchor="ctr"/>
-          <a:lstStyle/>
-          <a:p>
-            <a:pPr algn="ctr"/>
-            <a:endParaRPr lang="es-MX"/>
-          </a:p>
-        </p:txBody>
-      </p:sp>
-      <p:sp>
-        <p:nvSpPr>
-          <p:cNvPr id="5" name="Rectángulo 4"/>
-          <p:cNvSpPr/>
-          <p:nvPr/>
-        </p:nvSpPr>
-        <p:spPr>
-          <a:xfrm>
-            <a:off x="0" y="6570133"/>
-            <a:ext cx="12192000" cy="287867"/>
-          </a:xfrm>
-          <a:prstGeom prst="rect">
-            <a:avLst/>
-          </a:prstGeom>
-          <a:solidFill>
-            <a:schemeClr val="accent2">
-              <a:lumMod val="75000"/>
-            </a:schemeClr>
-          </a:solidFill>
-          <a:ln>
-            <a:solidFill>
-              <a:schemeClr val="tx1"/>
-            </a:solidFill>
-          </a:ln>
-        </p:spPr>
-        <p:style>
-          <a:lnRef idx="2">
-            <a:schemeClr val="accent1">
-              <a:shade val="50000"/>
-            </a:schemeClr>
-          </a:lnRef>
-          <a:fillRef idx="1">
-            <a:schemeClr val="accent1"/>
-          </a:fillRef>
-          <a:effectRef idx="0">
-            <a:schemeClr val="accent1"/>
-          </a:effectRef>
-          <a:fontRef idx="minor">
-            <a:schemeClr val="lt1"/>
-          </a:fontRef>
-        </p:style>
-        <p:txBody>
-          <a:bodyPr rtlCol="0" anchor="ctr"/>
-          <a:lstStyle/>
-          <a:p>
-            <a:pPr algn="ctr"/>
-            <a:endParaRPr lang="es-MX"/>
-          </a:p>
-        </p:txBody>
-      </p:sp>
-      <p:pic>
-        <p:nvPicPr>
-          <p:cNvPr id="7" name="Imagen 6"/>
-          <p:cNvPicPr>
-            <a:picLocks noChangeAspect="1"/>
-          </p:cNvPicPr>
-          <p:nvPr/>
-        </p:nvPicPr>
-        <p:blipFill>
-          <a:blip r:embed="rId2"/>
-          <a:stretch>
-            <a:fillRect/>
-          </a:stretch>
-        </p:blipFill>
-        <p:spPr>
-          <a:xfrm>
-            <a:off x="1954214" y="2448587"/>
-            <a:ext cx="1879758" cy="3620029"/>
-          </a:xfrm>
-          <a:prstGeom prst="rect">
-            <a:avLst/>
-          </a:prstGeom>
-        </p:spPr>
-      </p:pic>
+              <a:rPr lang="es-MX" dirty="0" smtClean="0"/>
+              <a:t>Sorteo</a:t>
+            </a:r>
+          </a:p>
+          <a:p>
+            <a:endParaRPr lang="es-MX" dirty="0" smtClean="0"/>
+          </a:p>
+          <a:p>
+            <a:r>
+              <a:rPr lang="es-MX" dirty="0" smtClean="0"/>
+              <a:t>Asignación aleatoria de números</a:t>
+            </a:r>
+          </a:p>
+          <a:p>
+            <a:endParaRPr lang="es-MX" dirty="0" smtClean="0"/>
+          </a:p>
+          <a:p>
+            <a:r>
+              <a:rPr lang="es-MX" b="1" dirty="0" smtClean="0"/>
+              <a:t>Marco </a:t>
+            </a:r>
+            <a:r>
+              <a:rPr lang="es-MX" b="1" dirty="0" err="1" smtClean="0"/>
+              <a:t>muestral</a:t>
+            </a:r>
+            <a:r>
+              <a:rPr lang="es-MX" b="1" dirty="0" smtClean="0"/>
+              <a:t> </a:t>
+            </a:r>
+          </a:p>
+          <a:p>
+            <a:pPr marL="457200" lvl="1" indent="0">
+              <a:buNone/>
+            </a:pPr>
+            <a:r>
+              <a:rPr lang="es-MX" dirty="0" smtClean="0"/>
+              <a:t>Cualquier esquematización con la que ya se cuente y que permita capturar la variabilidad de mi población. </a:t>
+            </a:r>
+          </a:p>
+        </p:txBody>
+      </p:sp>
     </p:spTree>
     <p:extLst>
       <p:ext uri="{BB962C8B-B14F-4D97-AF65-F5344CB8AC3E}">
-        <p14:creationId xmlns:p14="http://schemas.microsoft.com/office/powerpoint/2010/main" val="2798528973"/>
+        <p14:creationId xmlns:p14="http://schemas.microsoft.com/office/powerpoint/2010/main" val="3735682424"/>
       </p:ext>
     </p:extLst>
   </p:cSld>
   <p:clrMapOvr>
     <a:masterClrMapping/>
   </p:clrMapOvr>
+  <p:timing>
+    <p:tnLst>
+      <p:par>
+        <p:cTn id="1" dur="indefinite" restart="never" nodeType="tmRoot"/>
+      </p:par>
+    </p:tnLst>
+  </p:timing>
 </p:sld>
 </file>
 
@@ -6457,14 +6342,12 @@
         </p:nvSpPr>
         <p:spPr/>
         <p:txBody>
-          <a:bodyPr>
-            <a:normAutofit fontScale="90000"/>
-          </a:bodyPr>
+          <a:bodyPr/>
           <a:lstStyle/>
           <a:p>
             <a:r>
               <a:rPr lang="es-MX" b="1" dirty="0" smtClean="0"/>
-              <a:t>Garantizar que todos los elementos de la población tengan la misma probabilidad de ser seleccionados.</a:t>
+              <a:t>Muestra no probabilística</a:t>
             </a:r>
             <a:endParaRPr lang="es-MX" b="1" dirty="0"/>
           </a:p>
@@ -6485,15 +6368,28 @@
           <a:bodyPr/>
           <a:lstStyle/>
           <a:p>
-            <a:r>
-              <a:rPr lang="es-MX" b="1" u="sng" dirty="0" smtClean="0"/>
-              <a:t>Muestreo por Racimos / </a:t>
-            </a:r>
-            <a:r>
-              <a:rPr lang="es-MX" b="1" u="sng" dirty="0" err="1" smtClean="0"/>
-              <a:t>Clusters</a:t>
-            </a:r>
-            <a:endParaRPr lang="es-MX" b="1" u="sng" dirty="0"/>
+            <a:pPr algn="just"/>
+            <a:r>
+              <a:rPr lang="es-MX" dirty="0" smtClean="0"/>
+              <a:t>Idealmente </a:t>
+            </a:r>
+            <a:r>
+              <a:rPr lang="es-MX" b="1" dirty="0" smtClean="0"/>
+              <a:t>toda muestra debería ser probabilística, </a:t>
+            </a:r>
+            <a:r>
+              <a:rPr lang="es-MX" dirty="0" smtClean="0"/>
+              <a:t>pero hay ocasiones en que las </a:t>
+            </a:r>
+            <a:r>
+              <a:rPr lang="es-MX" b="1" dirty="0" smtClean="0"/>
+              <a:t>características/propósito </a:t>
+            </a:r>
+            <a:r>
+              <a:rPr lang="es-MX" dirty="0" smtClean="0"/>
+              <a:t>de la investigación no lo permiten. </a:t>
+            </a:r>
+            <a:endParaRPr lang="es-MX" dirty="0"/>
           </a:p>
         </p:txBody>
       </p:sp>
@@ -6512,7 +6408,7 @@
             <a:avLst/>
           </a:prstGeom>
           <a:solidFill>
-            <a:schemeClr val="accent2">
+            <a:schemeClr val="accent1">
               <a:lumMod val="75000"/>
             </a:schemeClr>
           </a:solidFill>
@@ -6562,7 +6458,7 @@
             <a:avLst/>
           </a:prstGeom>
           <a:solidFill>
-            <a:schemeClr val="accent2">
+            <a:schemeClr val="accent1">
               <a:lumMod val="75000"/>
             </a:schemeClr>
           </a:solidFill>
@@ -6597,40 +6493,87 @@
           </a:p>
         </p:txBody>
       </p:sp>
-      <p:pic>
-        <p:nvPicPr>
-          <p:cNvPr id="6" name="Imagen 5"/>
-          <p:cNvPicPr>
-            <a:picLocks noChangeAspect="1"/>
-          </p:cNvPicPr>
+      <p:sp>
+        <p:nvSpPr>
+          <p:cNvPr id="6" name="CuadroTexto 5"/>
+          <p:cNvSpPr txBox="1"/>
           <p:nvPr/>
-        </p:nvPicPr>
-        <p:blipFill>
-          <a:blip r:embed="rId2"/>
-          <a:stretch>
-            <a:fillRect/>
-          </a:stretch>
-        </p:blipFill>
-        <p:spPr>
-          <a:xfrm>
-            <a:off x="2439988" y="2448587"/>
-            <a:ext cx="6534680" cy="3728376"/>
+        </p:nvSpPr>
+        <p:spPr>
+          <a:xfrm>
+            <a:off x="1244600" y="3793068"/>
+            <a:ext cx="9702800" cy="1200329"/>
           </a:xfrm>
           <a:prstGeom prst="rect">
             <a:avLst/>
           </a:prstGeom>
-        </p:spPr>
-      </p:pic>
+          <a:solidFill>
+            <a:schemeClr val="accent5">
+              <a:lumMod val="20000"/>
+              <a:lumOff val="80000"/>
+            </a:schemeClr>
+          </a:solidFill>
+          <a:ln w="28575">
+            <a:solidFill>
+              <a:schemeClr val="tx1"/>
+            </a:solidFill>
+            <a:prstDash val="lgDashDot"/>
+          </a:ln>
+        </p:spPr>
+        <p:txBody>
+          <a:bodyPr wrap="square" rtlCol="0">
+            <a:spAutoFit/>
+          </a:bodyPr>
+          <a:lstStyle/>
+          <a:p>
+            <a:r>
+              <a:rPr lang="es-MX" b="1" dirty="0" smtClean="0"/>
+              <a:t>Por ejemplo:</a:t>
+            </a:r>
+          </a:p>
+          <a:p>
+            <a:endParaRPr lang="es-MX" b="1" dirty="0"/>
+          </a:p>
+          <a:p>
+            <a:r>
+              <a:rPr lang="es-MX" b="1" dirty="0" smtClean="0"/>
+              <a:t>Población: </a:t>
+            </a:r>
+            <a:r>
+              <a:rPr lang="es-MX" dirty="0" smtClean="0"/>
+              <a:t>Personas con la enfermedad de los huesos de cristal</a:t>
+            </a:r>
+          </a:p>
+          <a:p>
+            <a:r>
+              <a:rPr lang="es-MX" b="1" dirty="0" smtClean="0"/>
+              <a:t>Muestra: </a:t>
+            </a:r>
+            <a:r>
+              <a:rPr lang="es-MX" dirty="0" smtClean="0"/>
+              <a:t>Personas internadas en hospitales de la CDMX con dicha enfermedad</a:t>
+            </a:r>
+            <a:endParaRPr lang="es-MX" b="1" dirty="0"/>
+          </a:p>
+        </p:txBody>
+      </p:sp>
     </p:spTree>
     <p:extLst>
       <p:ext uri="{BB962C8B-B14F-4D97-AF65-F5344CB8AC3E}">
-        <p14:creationId xmlns:p14="http://schemas.microsoft.com/office/powerpoint/2010/main" val="1617227629"/>
+        <p14:creationId xmlns:p14="http://schemas.microsoft.com/office/powerpoint/2010/main" val="2203232833"/>
       </p:ext>
     </p:extLst>
   </p:cSld>
   <p:clrMapOvr>
     <a:masterClrMapping/>
   </p:clrMapOvr>
+  <p:timing>
+    <p:tnLst>
+      <p:par>
+        <p:cTn id="1" dur="indefinite" restart="never" nodeType="tmRoot"/>
+      </p:par>
+    </p:tnLst>
+  </p:timing>
 </p:sld>
 </file>
 
@@ -6661,90 +6604,95 @@
             <p:ph type="title"/>
           </p:nvPr>
         </p:nvSpPr>
-        <p:spPr/>
-        <p:txBody>
-          <a:bodyPr/>
-          <a:lstStyle/>
-          <a:p>
-            <a:r>
-              <a:rPr lang="es-MX" dirty="0" smtClean="0"/>
-              <a:t>Métodos para conseguir una </a:t>
-            </a:r>
-            <a:r>
-              <a:rPr lang="es-MX" b="1" dirty="0" smtClean="0"/>
-              <a:t>muestra probabilística</a:t>
-            </a:r>
-            <a:endParaRPr lang="es-MX" dirty="0"/>
-          </a:p>
-        </p:txBody>
-      </p:sp>
-      <p:sp>
-        <p:nvSpPr>
-          <p:cNvPr id="3" name="Marcador de contenido 2"/>
-          <p:cNvSpPr>
-            <a:spLocks noGrp="1"/>
-          </p:cNvSpPr>
-          <p:nvPr>
-            <p:ph idx="1"/>
-          </p:nvPr>
-        </p:nvSpPr>
-        <p:spPr/>
-        <p:txBody>
-          <a:bodyPr/>
-          <a:lstStyle/>
-          <a:p>
-            <a:r>
-              <a:rPr lang="es-MX" dirty="0" smtClean="0"/>
-              <a:t>Sorteo</a:t>
-            </a:r>
-          </a:p>
-          <a:p>
-            <a:endParaRPr lang="es-MX" dirty="0" smtClean="0"/>
-          </a:p>
-          <a:p>
-            <a:r>
-              <a:rPr lang="es-MX" dirty="0" smtClean="0"/>
-              <a:t>Asignación aleatoria de números</a:t>
-            </a:r>
-          </a:p>
-          <a:p>
-            <a:endParaRPr lang="es-MX" dirty="0" smtClean="0"/>
-          </a:p>
-          <a:p>
-            <a:r>
-              <a:rPr lang="es-MX" b="1" dirty="0" smtClean="0"/>
-              <a:t>Marco </a:t>
-            </a:r>
-            <a:r>
-              <a:rPr lang="es-MX" b="1" dirty="0" err="1" smtClean="0"/>
-              <a:t>muestral</a:t>
-            </a:r>
-            <a:r>
-              <a:rPr lang="es-MX" b="1" dirty="0" smtClean="0"/>
-              <a:t> </a:t>
-            </a:r>
-          </a:p>
-          <a:p>
-            <a:pPr marL="457200" lvl="1" indent="0">
-              <a:buNone/>
-            </a:pPr>
-            <a:r>
-              <a:rPr lang="es-MX" dirty="0" smtClean="0"/>
-              <a:t>Cualquier esquematización con la que ya se cuente y que permita capturar la variabilidad de mi población. </a:t>
-            </a:r>
-          </a:p>
-        </p:txBody>
-      </p:sp>
+        <p:spPr>
+          <a:xfrm>
+            <a:off x="778933" y="2216149"/>
+            <a:ext cx="10515600" cy="1325563"/>
+          </a:xfrm>
+        </p:spPr>
+        <p:txBody>
+          <a:bodyPr>
+            <a:normAutofit/>
+          </a:bodyPr>
+          <a:lstStyle/>
+          <a:p>
+            <a:r>
+              <a:rPr lang="es-MX" sz="6000" b="1" dirty="0" smtClean="0">
+                <a:latin typeface="AR DELANEY" panose="02000000000000000000" pitchFamily="2" charset="0"/>
+              </a:rPr>
+              <a:t>Ejemplos: </a:t>
+            </a:r>
+            <a:endParaRPr lang="es-MX" sz="6000" b="1" dirty="0">
+              <a:latin typeface="AR DELANEY" panose="02000000000000000000" pitchFamily="2" charset="0"/>
+            </a:endParaRPr>
+          </a:p>
+        </p:txBody>
+      </p:sp>
+      <p:pic>
+        <p:nvPicPr>
+          <p:cNvPr id="4" name="Imagen 3"/>
+          <p:cNvPicPr>
+            <a:picLocks noChangeAspect="1"/>
+          </p:cNvPicPr>
+          <p:nvPr/>
+        </p:nvPicPr>
+        <p:blipFill>
+          <a:blip r:embed="rId2"/>
+          <a:stretch>
+            <a:fillRect/>
+          </a:stretch>
+        </p:blipFill>
+        <p:spPr>
+          <a:xfrm>
+            <a:off x="0" y="1"/>
+            <a:ext cx="12192000" cy="1600200"/>
+          </a:xfrm>
+          <a:prstGeom prst="rect">
+            <a:avLst/>
+          </a:prstGeom>
+        </p:spPr>
+      </p:pic>
+      <p:pic>
+        <p:nvPicPr>
+          <p:cNvPr id="5" name="Imagen 4"/>
+          <p:cNvPicPr>
+            <a:picLocks noChangeAspect="1"/>
+          </p:cNvPicPr>
+          <p:nvPr/>
+        </p:nvPicPr>
+        <p:blipFill>
+          <a:blip r:embed="rId2"/>
+          <a:stretch>
+            <a:fillRect/>
+          </a:stretch>
+        </p:blipFill>
+        <p:spPr>
+          <a:xfrm>
+            <a:off x="0" y="5257800"/>
+            <a:ext cx="12192000" cy="1600200"/>
+          </a:xfrm>
+          <a:prstGeom prst="rect">
+            <a:avLst/>
+          </a:prstGeom>
+        </p:spPr>
+      </p:pic>
     </p:spTree>
     <p:extLst>
       <p:ext uri="{BB962C8B-B14F-4D97-AF65-F5344CB8AC3E}">
-        <p14:creationId xmlns:p14="http://schemas.microsoft.com/office/powerpoint/2010/main" val="3735682424"/>
+        <p14:creationId xmlns:p14="http://schemas.microsoft.com/office/powerpoint/2010/main" val="3560570859"/>
       </p:ext>
     </p:extLst>
   </p:cSld>
   <p:clrMapOvr>
     <a:masterClrMapping/>
   </p:clrMapOvr>
+  <p:timing>
+    <p:tnLst>
+      <p:par>
+        <p:cTn id="1" dur="indefinite" restart="never" nodeType="tmRoot"/>
+      </p:par>
+    </p:tnLst>
+  </p:timing>
 </p:sld>
 </file>
 
@@ -6775,14 +6723,401 @@
             <p:ph type="title"/>
           </p:nvPr>
         </p:nvSpPr>
+        <p:spPr>
+          <a:xfrm>
+            <a:off x="0" y="-111394"/>
+            <a:ext cx="10515600" cy="1325563"/>
+          </a:xfrm>
+          <a:solidFill>
+            <a:schemeClr val="accent4">
+              <a:lumMod val="60000"/>
+              <a:lumOff val="40000"/>
+            </a:schemeClr>
+          </a:solidFill>
+        </p:spPr>
+        <p:txBody>
+          <a:bodyPr/>
+          <a:lstStyle/>
+          <a:p>
+            <a:r>
+              <a:rPr lang="es-MX" dirty="0" smtClean="0"/>
+              <a:t>1936 – Encuesta electoral telefónica (U.S)</a:t>
+            </a:r>
+            <a:endParaRPr lang="es-MX" dirty="0"/>
+          </a:p>
+        </p:txBody>
+      </p:sp>
+      <p:sp>
+        <p:nvSpPr>
+          <p:cNvPr id="3" name="Marcador de contenido 2"/>
+          <p:cNvSpPr>
+            <a:spLocks noGrp="1"/>
+          </p:cNvSpPr>
+          <p:nvPr>
+            <p:ph idx="1"/>
+          </p:nvPr>
+        </p:nvSpPr>
         <p:spPr/>
         <p:txBody>
           <a:bodyPr/>
           <a:lstStyle/>
           <a:p>
+            <a:endParaRPr lang="es-MX" dirty="0" smtClean="0"/>
+          </a:p>
+          <a:p>
+            <a:endParaRPr lang="es-MX" dirty="0" smtClean="0"/>
+          </a:p>
+          <a:p>
+            <a:endParaRPr lang="es-MX" dirty="0"/>
+          </a:p>
+        </p:txBody>
+      </p:sp>
+      <p:sp>
+        <p:nvSpPr>
+          <p:cNvPr id="4" name="Rectángulo redondeado 3"/>
+          <p:cNvSpPr/>
+          <p:nvPr/>
+        </p:nvSpPr>
+        <p:spPr>
+          <a:xfrm>
+            <a:off x="361682" y="1394474"/>
+            <a:ext cx="5511085" cy="2430551"/>
+          </a:xfrm>
+          <a:prstGeom prst="roundRect">
+            <a:avLst/>
+          </a:prstGeom>
+        </p:spPr>
+        <p:style>
+          <a:lnRef idx="1">
+            <a:schemeClr val="accent2"/>
+          </a:lnRef>
+          <a:fillRef idx="2">
+            <a:schemeClr val="accent2"/>
+          </a:fillRef>
+          <a:effectRef idx="1">
+            <a:schemeClr val="accent2"/>
+          </a:effectRef>
+          <a:fontRef idx="minor">
+            <a:schemeClr val="dk1"/>
+          </a:fontRef>
+        </p:style>
+        <p:txBody>
+          <a:bodyPr rtlCol="0" anchor="ctr"/>
+          <a:lstStyle/>
+          <a:p>
+            <a:pPr algn="ctr"/>
+            <a:endParaRPr lang="es-MX"/>
+          </a:p>
+        </p:txBody>
+      </p:sp>
+      <p:sp>
+        <p:nvSpPr>
+          <p:cNvPr id="5" name="Rectángulo redondeado 4"/>
+          <p:cNvSpPr/>
+          <p:nvPr/>
+        </p:nvSpPr>
+        <p:spPr>
+          <a:xfrm>
+            <a:off x="656823" y="2910625"/>
+            <a:ext cx="2047740" cy="682581"/>
+          </a:xfrm>
+          <a:prstGeom prst="roundRect">
+            <a:avLst/>
+          </a:prstGeom>
+        </p:spPr>
+        <p:style>
+          <a:lnRef idx="0">
+            <a:schemeClr val="accent6"/>
+          </a:lnRef>
+          <a:fillRef idx="3">
+            <a:schemeClr val="accent6"/>
+          </a:fillRef>
+          <a:effectRef idx="3">
+            <a:schemeClr val="accent6"/>
+          </a:effectRef>
+          <a:fontRef idx="minor">
+            <a:schemeClr val="lt1"/>
+          </a:fontRef>
+        </p:style>
+        <p:txBody>
+          <a:bodyPr rtlCol="0" anchor="ctr"/>
+          <a:lstStyle/>
+          <a:p>
+            <a:pPr algn="ctr"/>
+            <a:r>
+              <a:rPr lang="es-MX" dirty="0" smtClean="0"/>
+              <a:t>~ 65%</a:t>
+            </a:r>
+            <a:endParaRPr lang="es-MX" dirty="0"/>
+          </a:p>
+        </p:txBody>
+      </p:sp>
+      <p:sp>
+        <p:nvSpPr>
+          <p:cNvPr id="6" name="Rectángulo redondeado 5"/>
+          <p:cNvSpPr/>
+          <p:nvPr/>
+        </p:nvSpPr>
+        <p:spPr>
+          <a:xfrm>
+            <a:off x="3397339" y="2878427"/>
+            <a:ext cx="2047740" cy="682581"/>
+          </a:xfrm>
+          <a:prstGeom prst="roundRect">
+            <a:avLst/>
+          </a:prstGeom>
+        </p:spPr>
+        <p:style>
+          <a:lnRef idx="0">
+            <a:schemeClr val="accent2"/>
+          </a:lnRef>
+          <a:fillRef idx="3">
+            <a:schemeClr val="accent2"/>
+          </a:fillRef>
+          <a:effectRef idx="3">
+            <a:schemeClr val="accent2"/>
+          </a:effectRef>
+          <a:fontRef idx="minor">
+            <a:schemeClr val="lt1"/>
+          </a:fontRef>
+        </p:style>
+        <p:txBody>
+          <a:bodyPr rtlCol="0" anchor="ctr"/>
+          <a:lstStyle/>
+          <a:p>
+            <a:pPr algn="ctr"/>
+            <a:r>
+              <a:rPr lang="es-MX" dirty="0" smtClean="0"/>
+              <a:t>~ 35 %</a:t>
+            </a:r>
+            <a:endParaRPr lang="es-MX" dirty="0"/>
+          </a:p>
+        </p:txBody>
+      </p:sp>
+      <p:sp>
+        <p:nvSpPr>
+          <p:cNvPr id="7" name="Flecha doblada 6"/>
+          <p:cNvSpPr/>
+          <p:nvPr/>
+        </p:nvSpPr>
+        <p:spPr>
+          <a:xfrm rot="5069790">
+            <a:off x="6272011" y="2215166"/>
+            <a:ext cx="1442434" cy="1210614"/>
+          </a:xfrm>
+          <a:prstGeom prst="bentArrow">
+            <a:avLst/>
+          </a:prstGeom>
+        </p:spPr>
+        <p:style>
+          <a:lnRef idx="0">
+            <a:schemeClr val="accent4"/>
+          </a:lnRef>
+          <a:fillRef idx="3">
+            <a:schemeClr val="accent4"/>
+          </a:fillRef>
+          <a:effectRef idx="3">
+            <a:schemeClr val="accent4"/>
+          </a:effectRef>
+          <a:fontRef idx="minor">
+            <a:schemeClr val="lt1"/>
+          </a:fontRef>
+        </p:style>
+        <p:txBody>
+          <a:bodyPr rtlCol="0" anchor="ctr"/>
+          <a:lstStyle/>
+          <a:p>
+            <a:pPr algn="ctr"/>
+            <a:endParaRPr lang="es-MX">
+              <a:solidFill>
+                <a:schemeClr val="tx1"/>
+              </a:solidFill>
+            </a:endParaRPr>
+          </a:p>
+        </p:txBody>
+      </p:sp>
+      <p:sp>
+        <p:nvSpPr>
+          <p:cNvPr id="8" name="Rectángulo redondeado 7"/>
+          <p:cNvSpPr/>
+          <p:nvPr/>
+        </p:nvSpPr>
+        <p:spPr>
+          <a:xfrm>
+            <a:off x="6155029" y="4058255"/>
+            <a:ext cx="5511085" cy="2430551"/>
+          </a:xfrm>
+          <a:prstGeom prst="roundRect">
+            <a:avLst/>
+          </a:prstGeom>
+        </p:spPr>
+        <p:style>
+          <a:lnRef idx="1">
+            <a:schemeClr val="accent6"/>
+          </a:lnRef>
+          <a:fillRef idx="2">
+            <a:schemeClr val="accent6"/>
+          </a:fillRef>
+          <a:effectRef idx="1">
+            <a:schemeClr val="accent6"/>
+          </a:effectRef>
+          <a:fontRef idx="minor">
+            <a:schemeClr val="dk1"/>
+          </a:fontRef>
+        </p:style>
+        <p:txBody>
+          <a:bodyPr rtlCol="0" anchor="ctr"/>
+          <a:lstStyle/>
+          <a:p>
+            <a:pPr algn="ctr"/>
+            <a:endParaRPr lang="es-MX"/>
+          </a:p>
+        </p:txBody>
+      </p:sp>
+      <p:sp>
+        <p:nvSpPr>
+          <p:cNvPr id="9" name="Rectángulo redondeado 8"/>
+          <p:cNvSpPr/>
+          <p:nvPr/>
+        </p:nvSpPr>
+        <p:spPr>
+          <a:xfrm>
+            <a:off x="6450170" y="5574406"/>
+            <a:ext cx="2047740" cy="682581"/>
+          </a:xfrm>
+          <a:prstGeom prst="roundRect">
+            <a:avLst/>
+          </a:prstGeom>
+        </p:spPr>
+        <p:style>
+          <a:lnRef idx="0">
+            <a:schemeClr val="accent2"/>
+          </a:lnRef>
+          <a:fillRef idx="3">
+            <a:schemeClr val="accent2"/>
+          </a:fillRef>
+          <a:effectRef idx="3">
+            <a:schemeClr val="accent2"/>
+          </a:effectRef>
+          <a:fontRef idx="minor">
+            <a:schemeClr val="lt1"/>
+          </a:fontRef>
+        </p:style>
+        <p:txBody>
+          <a:bodyPr rtlCol="0" anchor="ctr"/>
+          <a:lstStyle/>
+          <a:p>
+            <a:pPr algn="ctr"/>
+            <a:r>
+              <a:rPr lang="es-MX" dirty="0" smtClean="0"/>
+              <a:t>~ 35%</a:t>
+            </a:r>
+            <a:endParaRPr lang="es-MX" dirty="0"/>
+          </a:p>
+        </p:txBody>
+      </p:sp>
+      <p:sp>
+        <p:nvSpPr>
+          <p:cNvPr id="10" name="Rectángulo redondeado 9"/>
+          <p:cNvSpPr/>
+          <p:nvPr/>
+        </p:nvSpPr>
+        <p:spPr>
+          <a:xfrm>
+            <a:off x="9190686" y="5542208"/>
+            <a:ext cx="2047740" cy="682581"/>
+          </a:xfrm>
+          <a:prstGeom prst="roundRect">
+            <a:avLst/>
+          </a:prstGeom>
+        </p:spPr>
+        <p:style>
+          <a:lnRef idx="0">
+            <a:schemeClr val="accent6"/>
+          </a:lnRef>
+          <a:fillRef idx="3">
+            <a:schemeClr val="accent6"/>
+          </a:fillRef>
+          <a:effectRef idx="3">
+            <a:schemeClr val="accent6"/>
+          </a:effectRef>
+          <a:fontRef idx="minor">
+            <a:schemeClr val="lt1"/>
+          </a:fontRef>
+        </p:style>
+        <p:txBody>
+          <a:bodyPr rtlCol="0" anchor="ctr"/>
+          <a:lstStyle/>
+          <a:p>
+            <a:pPr algn="ctr"/>
+            <a:r>
+              <a:rPr lang="es-MX" dirty="0" smtClean="0"/>
+              <a:t>~ 65 %</a:t>
+            </a:r>
+            <a:endParaRPr lang="es-MX" dirty="0"/>
+          </a:p>
+        </p:txBody>
+      </p:sp>
+    </p:spTree>
+    <p:extLst>
+      <p:ext uri="{BB962C8B-B14F-4D97-AF65-F5344CB8AC3E}">
+        <p14:creationId xmlns:p14="http://schemas.microsoft.com/office/powerpoint/2010/main" val="1708127568"/>
+      </p:ext>
+    </p:extLst>
+  </p:cSld>
+  <p:clrMapOvr>
+    <a:masterClrMapping/>
+  </p:clrMapOvr>
+  <p:timing>
+    <p:tnLst>
+      <p:par>
+        <p:cTn id="1" dur="indefinite" restart="never" nodeType="tmRoot"/>
+      </p:par>
+    </p:tnLst>
+  </p:timing>
+</p:sld>
+</file>
+
+<file path=ppt/slides/slide25.xml><?xml version="1.0" encoding="utf-8"?>
+<p:sld xmlns:a="http://schemas.openxmlformats.org/drawingml/2006/main" xmlns:r="http://schemas.openxmlformats.org/officeDocument/2006/relationships" xmlns:p="http://schemas.openxmlformats.org/presentationml/2006/main">
+  <p:cSld>
+    <p:spTree>
+      <p:nvGrpSpPr>
+        <p:cNvPr id="1" name=""/>
+        <p:cNvGrpSpPr/>
+        <p:nvPr/>
+      </p:nvGrpSpPr>
+      <p:grpSpPr>
+        <a:xfrm>
+          <a:off x="0" y="0"/>
+          <a:ext cx="0" cy="0"/>
+          <a:chOff x="0" y="0"/>
+          <a:chExt cx="0" cy="0"/>
+        </a:xfrm>
+      </p:grpSpPr>
+      <p:sp>
+        <p:nvSpPr>
+          <p:cNvPr id="2" name="Título 1"/>
+          <p:cNvSpPr>
+            <a:spLocks noGrp="1"/>
+          </p:cNvSpPr>
+          <p:nvPr>
+            <p:ph type="title"/>
+          </p:nvPr>
+        </p:nvSpPr>
+        <p:spPr>
+          <a:xfrm>
+            <a:off x="838200" y="365125"/>
+            <a:ext cx="10515600" cy="727075"/>
+          </a:xfrm>
+        </p:spPr>
+        <p:txBody>
+          <a:bodyPr/>
+          <a:lstStyle/>
+          <a:p>
             <a:r>
               <a:rPr lang="es-MX" b="1" dirty="0" smtClean="0"/>
-              <a:t>Muestra no probabilística</a:t>
+              <a:t>“Casos de la Vida Real”</a:t>
             </a:r>
             <a:endParaRPr lang="es-MX" b="1" dirty="0"/>
           </a:p>
@@ -6790,7 +7125,7 @@
       </p:sp>
       <p:sp>
         <p:nvSpPr>
-          <p:cNvPr id="3" name="Marcador de contenido 2"/>
+          <p:cNvPr id="7" name="Marcador de contenido 6"/>
           <p:cNvSpPr>
             <a:spLocks noGrp="1"/>
           </p:cNvSpPr>
@@ -6798,39 +7133,26 @@
             <p:ph idx="1"/>
           </p:nvPr>
         </p:nvSpPr>
-        <p:spPr/>
+        <p:spPr>
+          <a:xfrm>
+            <a:off x="381000" y="1169457"/>
+            <a:ext cx="7950200" cy="5146675"/>
+          </a:xfrm>
+        </p:spPr>
         <p:txBody>
           <a:bodyPr/>
           <a:lstStyle/>
           <a:p>
-            <a:pPr algn="just"/>
-            <a:r>
-              <a:rPr lang="es-MX" dirty="0" smtClean="0"/>
-              <a:t>Idealmente </a:t>
-            </a:r>
-            <a:r>
-              <a:rPr lang="es-MX" b="1" dirty="0" smtClean="0"/>
-              <a:t>toda muestra debería ser probabilística, </a:t>
-            </a:r>
-            <a:r>
-              <a:rPr lang="es-MX" dirty="0" smtClean="0"/>
-              <a:t>pero hay ocasiones en que las </a:t>
-            </a:r>
-            <a:r>
-              <a:rPr lang="es-MX" b="1" dirty="0" smtClean="0"/>
-              <a:t>características/propósito </a:t>
-            </a:r>
-            <a:r>
-              <a:rPr lang="es-MX" dirty="0" smtClean="0"/>
-              <a:t>de la investigación no lo permiten. </a:t>
-            </a:r>
+            <a:endParaRPr lang="es-MX" dirty="0" smtClean="0"/>
+          </a:p>
+          <a:p>
             <a:endParaRPr lang="es-MX" dirty="0"/>
           </a:p>
         </p:txBody>
       </p:sp>
       <p:sp>
         <p:nvSpPr>
-          <p:cNvPr id="4" name="Rectángulo 3"/>
+          <p:cNvPr id="5" name="Rectángulo 4"/>
           <p:cNvSpPr/>
           <p:nvPr/>
         </p:nvSpPr>
@@ -6843,8 +7165,9 @@
             <a:avLst/>
           </a:prstGeom>
           <a:solidFill>
-            <a:schemeClr val="accent1">
-              <a:lumMod val="75000"/>
+            <a:schemeClr val="accent4">
+              <a:lumMod val="60000"/>
+              <a:lumOff val="40000"/>
             </a:schemeClr>
           </a:solidFill>
           <a:ln>
@@ -6880,7 +7203,7 @@
       </p:sp>
       <p:sp>
         <p:nvSpPr>
-          <p:cNvPr id="5" name="Rectángulo 4"/>
+          <p:cNvPr id="6" name="Rectángulo 5"/>
           <p:cNvSpPr/>
           <p:nvPr/>
         </p:nvSpPr>
@@ -6893,8 +7216,9 @@
             <a:avLst/>
           </a:prstGeom>
           <a:solidFill>
-            <a:schemeClr val="accent1">
-              <a:lumMod val="75000"/>
+            <a:schemeClr val="accent4">
+              <a:lumMod val="60000"/>
+              <a:lumOff val="40000"/>
             </a:schemeClr>
           </a:solidFill>
           <a:ln>
@@ -6928,80 +7252,371 @@
           </a:p>
         </p:txBody>
       </p:sp>
-      <p:sp>
-        <p:nvSpPr>
-          <p:cNvPr id="6" name="CuadroTexto 5"/>
-          <p:cNvSpPr txBox="1"/>
+      <p:pic>
+        <p:nvPicPr>
+          <p:cNvPr id="1026" name="Picture 2" descr="Resultado de imagen para Shere Hite 1991 Mujeres y amor"/>
+          <p:cNvPicPr>
+            <a:picLocks noChangeAspect="1" noChangeArrowheads="1"/>
+          </p:cNvPicPr>
           <p:nvPr/>
-        </p:nvSpPr>
-        <p:spPr>
-          <a:xfrm>
-            <a:off x="1244600" y="3793068"/>
-            <a:ext cx="9702800" cy="1200329"/>
+        </p:nvPicPr>
+        <p:blipFill>
+          <a:blip r:embed="rId2">
+            <a:extLst>
+              <a:ext uri="{28A0092B-C50C-407E-A947-70E740481C1C}">
+                <a14:useLocalDpi xmlns:a14="http://schemas.microsoft.com/office/drawing/2010/main" val="0"/>
+              </a:ext>
+            </a:extLst>
+          </a:blip>
+          <a:srcRect/>
+          <a:stretch>
+            <a:fillRect/>
+          </a:stretch>
+        </p:blipFill>
+        <p:spPr bwMode="auto">
+          <a:xfrm>
+            <a:off x="8682567" y="1604431"/>
+            <a:ext cx="2857500" cy="4276726"/>
           </a:xfrm>
           <a:prstGeom prst="rect">
             <a:avLst/>
           </a:prstGeom>
-          <a:solidFill>
-            <a:schemeClr val="accent5">
-              <a:lumMod val="20000"/>
-              <a:lumOff val="80000"/>
-            </a:schemeClr>
-          </a:solidFill>
-          <a:ln w="28575">
-            <a:solidFill>
-              <a:schemeClr val="tx1"/>
-            </a:solidFill>
-            <a:prstDash val="lgDashDot"/>
-          </a:ln>
-        </p:spPr>
-        <p:txBody>
-          <a:bodyPr wrap="square" rtlCol="0">
-            <a:spAutoFit/>
-          </a:bodyPr>
-          <a:lstStyle/>
-          <a:p>
-            <a:r>
-              <a:rPr lang="es-MX" b="1" dirty="0" smtClean="0"/>
-              <a:t>Por ejemplo:</a:t>
-            </a:r>
-          </a:p>
-          <a:p>
-            <a:endParaRPr lang="es-MX" b="1" dirty="0"/>
-          </a:p>
-          <a:p>
-            <a:r>
-              <a:rPr lang="es-MX" b="1" dirty="0" smtClean="0"/>
-              <a:t>Población: </a:t>
-            </a:r>
-            <a:r>
-              <a:rPr lang="es-MX" dirty="0" smtClean="0"/>
-              <a:t>Personas con la enfermedad de los huesos de cristal</a:t>
-            </a:r>
-          </a:p>
-          <a:p>
-            <a:r>
-              <a:rPr lang="es-MX" b="1" dirty="0" smtClean="0"/>
-              <a:t>Muestra: </a:t>
-            </a:r>
-            <a:r>
-              <a:rPr lang="es-MX" dirty="0" smtClean="0"/>
-              <a:t>Personas internadas en hospitales de la CDMX con dicha enfermedad</a:t>
-            </a:r>
-            <a:endParaRPr lang="es-MX" b="1" dirty="0"/>
-          </a:p>
-        </p:txBody>
-      </p:sp>
+          <a:noFill/>
+          <a:extLst>
+            <a:ext uri="{909E8E84-426E-40DD-AFC4-6F175D3DCCD1}">
+              <a14:hiddenFill xmlns:a14="http://schemas.microsoft.com/office/drawing/2010/main">
+                <a:solidFill>
+                  <a:srgbClr val="FFFFFF"/>
+                </a:solidFill>
+              </a14:hiddenFill>
+            </a:ext>
+          </a:extLst>
+        </p:spPr>
+      </p:pic>
+      <p:pic>
+        <p:nvPicPr>
+          <p:cNvPr id="4" name="Imagen 3"/>
+          <p:cNvPicPr>
+            <a:picLocks noChangeAspect="1"/>
+          </p:cNvPicPr>
+          <p:nvPr/>
+        </p:nvPicPr>
+        <p:blipFill>
+          <a:blip r:embed="rId3"/>
+          <a:stretch>
+            <a:fillRect/>
+          </a:stretch>
+        </p:blipFill>
+        <p:spPr>
+          <a:xfrm>
+            <a:off x="700087" y="2210269"/>
+            <a:ext cx="7779280" cy="2437462"/>
+          </a:xfrm>
+          <a:prstGeom prst="rect">
+            <a:avLst/>
+          </a:prstGeom>
+        </p:spPr>
+      </p:pic>
     </p:spTree>
     <p:extLst>
       <p:ext uri="{BB962C8B-B14F-4D97-AF65-F5344CB8AC3E}">
-        <p14:creationId xmlns:p14="http://schemas.microsoft.com/office/powerpoint/2010/main" val="2203232833"/>
+        <p14:creationId xmlns:p14="http://schemas.microsoft.com/office/powerpoint/2010/main" val="10988953"/>
       </p:ext>
     </p:extLst>
   </p:cSld>
   <p:clrMapOvr>
     <a:masterClrMapping/>
   </p:clrMapOvr>
+  <p:timing>
+    <p:tnLst>
+      <p:par>
+        <p:cTn id="1" dur="indefinite" restart="never" nodeType="tmRoot"/>
+      </p:par>
+    </p:tnLst>
+  </p:timing>
+</p:sld>
+</file>
+
+<file path=ppt/slides/slide26.xml><?xml version="1.0" encoding="utf-8"?>
+<p:sld xmlns:a="http://schemas.openxmlformats.org/drawingml/2006/main" xmlns:r="http://schemas.openxmlformats.org/officeDocument/2006/relationships" xmlns:p="http://schemas.openxmlformats.org/presentationml/2006/main">
+  <p:cSld>
+    <p:spTree>
+      <p:nvGrpSpPr>
+        <p:cNvPr id="1" name=""/>
+        <p:cNvGrpSpPr/>
+        <p:nvPr/>
+      </p:nvGrpSpPr>
+      <p:grpSpPr>
+        <a:xfrm>
+          <a:off x="0" y="0"/>
+          <a:ext cx="0" cy="0"/>
+          <a:chOff x="0" y="0"/>
+          <a:chExt cx="0" cy="0"/>
+        </a:xfrm>
+      </p:grpSpPr>
+      <p:sp>
+        <p:nvSpPr>
+          <p:cNvPr id="2" name="Título 1"/>
+          <p:cNvSpPr>
+            <a:spLocks noGrp="1"/>
+          </p:cNvSpPr>
+          <p:nvPr>
+            <p:ph type="title"/>
+          </p:nvPr>
+        </p:nvSpPr>
+        <p:spPr>
+          <a:xfrm>
+            <a:off x="838200" y="365125"/>
+            <a:ext cx="10515600" cy="727075"/>
+          </a:xfrm>
+        </p:spPr>
+        <p:txBody>
+          <a:bodyPr/>
+          <a:lstStyle/>
+          <a:p>
+            <a:r>
+              <a:rPr lang="es-MX" b="1" dirty="0" smtClean="0"/>
+              <a:t>“Casos de la Vida Real”</a:t>
+            </a:r>
+            <a:endParaRPr lang="es-MX" b="1" dirty="0"/>
+          </a:p>
+        </p:txBody>
+      </p:sp>
+      <p:sp>
+        <p:nvSpPr>
+          <p:cNvPr id="7" name="Marcador de contenido 6"/>
+          <p:cNvSpPr>
+            <a:spLocks noGrp="1"/>
+          </p:cNvSpPr>
+          <p:nvPr>
+            <p:ph idx="1"/>
+          </p:nvPr>
+        </p:nvSpPr>
+        <p:spPr>
+          <a:xfrm>
+            <a:off x="381000" y="1169457"/>
+            <a:ext cx="7950200" cy="5146675"/>
+          </a:xfrm>
+        </p:spPr>
+        <p:txBody>
+          <a:bodyPr/>
+          <a:lstStyle/>
+          <a:p>
+            <a:endParaRPr lang="es-MX" dirty="0" smtClean="0"/>
+          </a:p>
+          <a:p>
+            <a:endParaRPr lang="es-MX" dirty="0"/>
+          </a:p>
+        </p:txBody>
+      </p:sp>
+      <p:sp>
+        <p:nvSpPr>
+          <p:cNvPr id="5" name="Rectángulo 4"/>
+          <p:cNvSpPr/>
+          <p:nvPr/>
+        </p:nvSpPr>
+        <p:spPr>
+          <a:xfrm>
+            <a:off x="0" y="0"/>
+            <a:ext cx="12192000" cy="287867"/>
+          </a:xfrm>
+          <a:prstGeom prst="rect">
+            <a:avLst/>
+          </a:prstGeom>
+          <a:solidFill>
+            <a:schemeClr val="accent4">
+              <a:lumMod val="60000"/>
+              <a:lumOff val="40000"/>
+            </a:schemeClr>
+          </a:solidFill>
+          <a:ln>
+            <a:solidFill>
+              <a:schemeClr val="tx1"/>
+            </a:solidFill>
+          </a:ln>
+        </p:spPr>
+        <p:style>
+          <a:lnRef idx="2">
+            <a:schemeClr val="accent1">
+              <a:shade val="50000"/>
+            </a:schemeClr>
+          </a:lnRef>
+          <a:fillRef idx="1">
+            <a:schemeClr val="accent1"/>
+          </a:fillRef>
+          <a:effectRef idx="0">
+            <a:schemeClr val="accent1"/>
+          </a:effectRef>
+          <a:fontRef idx="minor">
+            <a:schemeClr val="lt1"/>
+          </a:fontRef>
+        </p:style>
+        <p:txBody>
+          <a:bodyPr rtlCol="0" anchor="ctr"/>
+          <a:lstStyle/>
+          <a:p>
+            <a:pPr algn="ctr"/>
+            <a:endParaRPr lang="es-MX"/>
+          </a:p>
+        </p:txBody>
+      </p:sp>
+      <p:sp>
+        <p:nvSpPr>
+          <p:cNvPr id="6" name="Rectángulo 5"/>
+          <p:cNvSpPr/>
+          <p:nvPr/>
+        </p:nvSpPr>
+        <p:spPr>
+          <a:xfrm>
+            <a:off x="0" y="6570133"/>
+            <a:ext cx="12192000" cy="287867"/>
+          </a:xfrm>
+          <a:prstGeom prst="rect">
+            <a:avLst/>
+          </a:prstGeom>
+          <a:solidFill>
+            <a:schemeClr val="accent4">
+              <a:lumMod val="60000"/>
+              <a:lumOff val="40000"/>
+            </a:schemeClr>
+          </a:solidFill>
+          <a:ln>
+            <a:solidFill>
+              <a:schemeClr val="tx1"/>
+            </a:solidFill>
+          </a:ln>
+        </p:spPr>
+        <p:style>
+          <a:lnRef idx="2">
+            <a:schemeClr val="accent1">
+              <a:shade val="50000"/>
+            </a:schemeClr>
+          </a:lnRef>
+          <a:fillRef idx="1">
+            <a:schemeClr val="accent1"/>
+          </a:fillRef>
+          <a:effectRef idx="0">
+            <a:schemeClr val="accent1"/>
+          </a:effectRef>
+          <a:fontRef idx="minor">
+            <a:schemeClr val="lt1"/>
+          </a:fontRef>
+        </p:style>
+        <p:txBody>
+          <a:bodyPr rtlCol="0" anchor="ctr"/>
+          <a:lstStyle/>
+          <a:p>
+            <a:pPr algn="ctr"/>
+            <a:endParaRPr lang="es-MX"/>
+          </a:p>
+        </p:txBody>
+      </p:sp>
+      <p:pic>
+        <p:nvPicPr>
+          <p:cNvPr id="1026" name="Picture 2" descr="Resultado de imagen para Shere Hite 1991 Mujeres y amor"/>
+          <p:cNvPicPr>
+            <a:picLocks noChangeAspect="1" noChangeArrowheads="1"/>
+          </p:cNvPicPr>
+          <p:nvPr/>
+        </p:nvPicPr>
+        <p:blipFill>
+          <a:blip r:embed="rId2">
+            <a:extLst>
+              <a:ext uri="{28A0092B-C50C-407E-A947-70E740481C1C}">
+                <a14:useLocalDpi xmlns:a14="http://schemas.microsoft.com/office/drawing/2010/main" val="0"/>
+              </a:ext>
+            </a:extLst>
+          </a:blip>
+          <a:srcRect/>
+          <a:stretch>
+            <a:fillRect/>
+          </a:stretch>
+        </p:blipFill>
+        <p:spPr bwMode="auto">
+          <a:xfrm>
+            <a:off x="8682567" y="1604431"/>
+            <a:ext cx="2857500" cy="4276726"/>
+          </a:xfrm>
+          <a:prstGeom prst="rect">
+            <a:avLst/>
+          </a:prstGeom>
+          <a:noFill/>
+          <a:extLst>
+            <a:ext uri="{909E8E84-426E-40DD-AFC4-6F175D3DCCD1}">
+              <a14:hiddenFill xmlns:a14="http://schemas.microsoft.com/office/drawing/2010/main">
+                <a:solidFill>
+                  <a:srgbClr val="FFFFFF"/>
+                </a:solidFill>
+              </a14:hiddenFill>
+            </a:ext>
+          </a:extLst>
+        </p:spPr>
+      </p:pic>
+      <p:pic>
+        <p:nvPicPr>
+          <p:cNvPr id="3" name="Imagen 2"/>
+          <p:cNvPicPr>
+            <a:picLocks noChangeAspect="1"/>
+          </p:cNvPicPr>
+          <p:nvPr/>
+        </p:nvPicPr>
+        <p:blipFill>
+          <a:blip r:embed="rId3"/>
+          <a:stretch>
+            <a:fillRect/>
+          </a:stretch>
+        </p:blipFill>
+        <p:spPr>
+          <a:xfrm>
+            <a:off x="84668" y="1346201"/>
+            <a:ext cx="8509000" cy="1348338"/>
+          </a:xfrm>
+          <a:prstGeom prst="rect">
+            <a:avLst/>
+          </a:prstGeom>
+        </p:spPr>
+      </p:pic>
+      <p:pic>
+        <p:nvPicPr>
+          <p:cNvPr id="8" name="Imagen 7"/>
+          <p:cNvPicPr>
+            <a:picLocks noChangeAspect="1"/>
+          </p:cNvPicPr>
+          <p:nvPr/>
+        </p:nvPicPr>
+        <p:blipFill>
+          <a:blip r:embed="rId4"/>
+          <a:stretch>
+            <a:fillRect/>
+          </a:stretch>
+        </p:blipFill>
+        <p:spPr>
+          <a:xfrm>
+            <a:off x="98954" y="2660672"/>
+            <a:ext cx="8494714" cy="3508521"/>
+          </a:xfrm>
+          <a:prstGeom prst="rect">
+            <a:avLst/>
+          </a:prstGeom>
+        </p:spPr>
+      </p:pic>
+    </p:spTree>
+    <p:extLst>
+      <p:ext uri="{BB962C8B-B14F-4D97-AF65-F5344CB8AC3E}">
+        <p14:creationId xmlns:p14="http://schemas.microsoft.com/office/powerpoint/2010/main" val="2507676810"/>
+      </p:ext>
+    </p:extLst>
+  </p:cSld>
+  <p:clrMapOvr>
+    <a:masterClrMapping/>
+  </p:clrMapOvr>
+  <p:timing>
+    <p:tnLst>
+      <p:par>
+        <p:cTn id="1" dur="indefinite" restart="never" nodeType="tmRoot"/>
+      </p:par>
+    </p:tnLst>
+  </p:timing>
 </p:sld>
 </file>
 
@@ -7437,6 +8052,13 @@
   <p:clrMapOvr>
     <a:masterClrMapping/>
   </p:clrMapOvr>
+  <p:timing>
+    <p:tnLst>
+      <p:par>
+        <p:cTn id="1" dur="indefinite" restart="never" nodeType="tmRoot"/>
+      </p:par>
+    </p:tnLst>
+  </p:timing>
 </p:sld>
 </file>
 
@@ -9109,6 +9731,13 @@
   <p:clrMapOvr>
     <a:masterClrMapping/>
   </p:clrMapOvr>
+  <p:timing>
+    <p:tnLst>
+      <p:par>
+        <p:cTn id="1" dur="indefinite" restart="never" nodeType="tmRoot"/>
+      </p:par>
+    </p:tnLst>
+  </p:timing>
 </p:sld>
 </file>
 
@@ -9221,6 +9850,13 @@
   <p:clrMapOvr>
     <a:masterClrMapping/>
   </p:clrMapOvr>
+  <p:timing>
+    <p:tnLst>
+      <p:par>
+        <p:cTn id="1" dur="indefinite" restart="never" nodeType="tmRoot"/>
+      </p:par>
+    </p:tnLst>
+  </p:timing>
 </p:sld>
 </file>
 

</xml_diff>